<commit_message>
final commit for figures
</commit_message>
<xml_diff>
--- a/paper_figures.pptx
+++ b/paper_figures.pptx
@@ -111,6 +111,11 @@
       </a:defRPr>
     </a:lvl9pPr>
   </p:defaultTextStyle>
+  <p:extLst>
+    <p:ext uri="{EFAFB233-063F-42B5-8137-9DF3F51BA10A}">
+      <p15:sldGuideLst xmlns:p15="http://schemas.microsoft.com/office/powerpoint/2012/main"/>
+    </p:ext>
+  </p:extLst>
 </p:presentation>
 </file>
 
@@ -261,7 +266,7 @@
           <a:p>
             <a:fld id="{D78F33A4-8745-4866-8F30-682B94E29380}" type="datetimeFigureOut">
               <a:rPr lang="en-US" smtClean="0"/>
-              <a:t>12/7/2024</a:t>
+              <a:t>12/13/2024</a:t>
             </a:fld>
             <a:endParaRPr lang="en-US"/>
           </a:p>
@@ -459,7 +464,7 @@
           <a:p>
             <a:fld id="{D78F33A4-8745-4866-8F30-682B94E29380}" type="datetimeFigureOut">
               <a:rPr lang="en-US" smtClean="0"/>
-              <a:t>12/7/2024</a:t>
+              <a:t>12/13/2024</a:t>
             </a:fld>
             <a:endParaRPr lang="en-US"/>
           </a:p>
@@ -667,7 +672,7 @@
           <a:p>
             <a:fld id="{D78F33A4-8745-4866-8F30-682B94E29380}" type="datetimeFigureOut">
               <a:rPr lang="en-US" smtClean="0"/>
-              <a:t>12/7/2024</a:t>
+              <a:t>12/13/2024</a:t>
             </a:fld>
             <a:endParaRPr lang="en-US"/>
           </a:p>
@@ -865,7 +870,7 @@
           <a:p>
             <a:fld id="{D78F33A4-8745-4866-8F30-682B94E29380}" type="datetimeFigureOut">
               <a:rPr lang="en-US" smtClean="0"/>
-              <a:t>12/7/2024</a:t>
+              <a:t>12/13/2024</a:t>
             </a:fld>
             <a:endParaRPr lang="en-US"/>
           </a:p>
@@ -1140,7 +1145,7 @@
           <a:p>
             <a:fld id="{D78F33A4-8745-4866-8F30-682B94E29380}" type="datetimeFigureOut">
               <a:rPr lang="en-US" smtClean="0"/>
-              <a:t>12/7/2024</a:t>
+              <a:t>12/13/2024</a:t>
             </a:fld>
             <a:endParaRPr lang="en-US"/>
           </a:p>
@@ -1405,7 +1410,7 @@
           <a:p>
             <a:fld id="{D78F33A4-8745-4866-8F30-682B94E29380}" type="datetimeFigureOut">
               <a:rPr lang="en-US" smtClean="0"/>
-              <a:t>12/7/2024</a:t>
+              <a:t>12/13/2024</a:t>
             </a:fld>
             <a:endParaRPr lang="en-US"/>
           </a:p>
@@ -1817,7 +1822,7 @@
           <a:p>
             <a:fld id="{D78F33A4-8745-4866-8F30-682B94E29380}" type="datetimeFigureOut">
               <a:rPr lang="en-US" smtClean="0"/>
-              <a:t>12/7/2024</a:t>
+              <a:t>12/13/2024</a:t>
             </a:fld>
             <a:endParaRPr lang="en-US"/>
           </a:p>
@@ -1958,7 +1963,7 @@
           <a:p>
             <a:fld id="{D78F33A4-8745-4866-8F30-682B94E29380}" type="datetimeFigureOut">
               <a:rPr lang="en-US" smtClean="0"/>
-              <a:t>12/7/2024</a:t>
+              <a:t>12/13/2024</a:t>
             </a:fld>
             <a:endParaRPr lang="en-US"/>
           </a:p>
@@ -2071,7 +2076,7 @@
           <a:p>
             <a:fld id="{D78F33A4-8745-4866-8F30-682B94E29380}" type="datetimeFigureOut">
               <a:rPr lang="en-US" smtClean="0"/>
-              <a:t>12/7/2024</a:t>
+              <a:t>12/13/2024</a:t>
             </a:fld>
             <a:endParaRPr lang="en-US"/>
           </a:p>
@@ -2382,7 +2387,7 @@
           <a:p>
             <a:fld id="{D78F33A4-8745-4866-8F30-682B94E29380}" type="datetimeFigureOut">
               <a:rPr lang="en-US" smtClean="0"/>
-              <a:t>12/7/2024</a:t>
+              <a:t>12/13/2024</a:t>
             </a:fld>
             <a:endParaRPr lang="en-US"/>
           </a:p>
@@ -2670,7 +2675,7 @@
           <a:p>
             <a:fld id="{D78F33A4-8745-4866-8F30-682B94E29380}" type="datetimeFigureOut">
               <a:rPr lang="en-US" smtClean="0"/>
-              <a:t>12/7/2024</a:t>
+              <a:t>12/13/2024</a:t>
             </a:fld>
             <a:endParaRPr lang="en-US"/>
           </a:p>
@@ -2911,7 +2916,7 @@
           <a:p>
             <a:fld id="{D78F33A4-8745-4866-8F30-682B94E29380}" type="datetimeFigureOut">
               <a:rPr lang="en-US" smtClean="0"/>
-              <a:t>12/7/2024</a:t>
+              <a:t>12/13/2024</a:t>
             </a:fld>
             <a:endParaRPr lang="en-US"/>
           </a:p>
@@ -4062,10 +4067,9 @@
           <a:p>
             <a:pPr algn="ctr"/>
             <a:r>
-              <a:rPr lang="en-US" dirty="0" err="1"/>
+              <a:rPr lang="en-US" dirty="0"/>
               <a:t>SwiGLU</a:t>
             </a:r>
-            <a:endParaRPr lang="en-US" dirty="0"/>
           </a:p>
         </p:txBody>
       </p:sp>
@@ -5131,10 +5135,9 @@
           <a:lstStyle/>
           <a:p>
             <a:r>
-              <a:rPr lang="en-US" dirty="0" err="1"/>
+              <a:rPr lang="en-US" dirty="0"/>
               <a:t>Nx</a:t>
             </a:r>
-            <a:endParaRPr lang="en-US" dirty="0"/>
           </a:p>
         </p:txBody>
       </p:sp>
@@ -5343,10 +5346,9 @@
           <a:p>
             <a:pPr algn="ctr"/>
             <a:r>
-              <a:rPr lang="en-US" dirty="0" err="1"/>
+              <a:rPr lang="en-US" dirty="0"/>
               <a:t>Softmax</a:t>
             </a:r>
-            <a:endParaRPr lang="en-US" dirty="0"/>
           </a:p>
         </p:txBody>
       </p:sp>
@@ -5606,346 +5608,10 @@
       </p:grpSpPr>
       <p:sp>
         <p:nvSpPr>
-          <p:cNvPr id="2" name="Title 1">
-            <a:extLst>
-              <a:ext uri="{FF2B5EF4-FFF2-40B4-BE49-F238E27FC236}">
-                <a16:creationId xmlns:a16="http://schemas.microsoft.com/office/drawing/2014/main" id="{B79529B7-784C-5F6E-862E-5267CBA73D73}"/>
-              </a:ext>
-            </a:extLst>
-          </p:cNvPr>
-          <p:cNvSpPr>
-            <a:spLocks noGrp="1"/>
-          </p:cNvSpPr>
-          <p:nvPr>
-            <p:ph type="title"/>
-          </p:nvPr>
-        </p:nvSpPr>
-        <p:spPr/>
-        <p:txBody>
-          <a:bodyPr/>
-          <a:lstStyle/>
-          <a:p>
-            <a:r>
-              <a:rPr lang="en-US" dirty="0"/>
-              <a:t>RMS Norm</a:t>
-            </a:r>
-          </a:p>
-        </p:txBody>
-      </p:sp>
-      <p:sp>
-        <p:nvSpPr>
-          <p:cNvPr id="3" name="Content Placeholder 2">
-            <a:extLst>
-              <a:ext uri="{FF2B5EF4-FFF2-40B4-BE49-F238E27FC236}">
-                <a16:creationId xmlns:a16="http://schemas.microsoft.com/office/drawing/2014/main" id="{04C1CA2E-1988-97BA-D7CB-798D4D6913A2}"/>
-              </a:ext>
-            </a:extLst>
-          </p:cNvPr>
-          <p:cNvSpPr>
-            <a:spLocks noGrp="1"/>
-          </p:cNvSpPr>
-          <p:nvPr>
-            <p:ph idx="1"/>
-          </p:nvPr>
-        </p:nvSpPr>
-        <p:spPr/>
-        <p:txBody>
-          <a:bodyPr/>
-          <a:lstStyle/>
-          <a:p>
-            <a:endParaRPr lang="en-US"/>
-          </a:p>
-        </p:txBody>
-      </p:sp>
-    </p:spTree>
-    <p:extLst>
-      <p:ext uri="{BB962C8B-B14F-4D97-AF65-F5344CB8AC3E}">
-        <p14:creationId xmlns:p14="http://schemas.microsoft.com/office/powerpoint/2010/main" val="2388354170"/>
-      </p:ext>
-    </p:extLst>
-  </p:cSld>
-  <p:clrMapOvr>
-    <a:masterClrMapping/>
-  </p:clrMapOvr>
-</p:sld>
-</file>
-
-<file path=ppt/slides/slide4.xml><?xml version="1.0" encoding="utf-8"?>
-<p:sld xmlns:a="http://schemas.openxmlformats.org/drawingml/2006/main" xmlns:r="http://schemas.openxmlformats.org/officeDocument/2006/relationships" xmlns:p="http://schemas.openxmlformats.org/presentationml/2006/main">
-  <p:cSld>
-    <p:spTree>
-      <p:nvGrpSpPr>
-        <p:cNvPr id="1" name=""/>
-        <p:cNvGrpSpPr/>
-        <p:nvPr/>
-      </p:nvGrpSpPr>
-      <p:grpSpPr>
-        <a:xfrm>
-          <a:off x="0" y="0"/>
-          <a:ext cx="0" cy="0"/>
-          <a:chOff x="0" y="0"/>
-          <a:chExt cx="0" cy="0"/>
-        </a:xfrm>
-      </p:grpSpPr>
-      <p:sp>
-        <p:nvSpPr>
-          <p:cNvPr id="2" name="Title 1">
-            <a:extLst>
-              <a:ext uri="{FF2B5EF4-FFF2-40B4-BE49-F238E27FC236}">
-                <a16:creationId xmlns:a16="http://schemas.microsoft.com/office/drawing/2014/main" id="{C0B4B7DA-9E84-57F3-A20E-B97BAEA531A1}"/>
-              </a:ext>
-            </a:extLst>
-          </p:cNvPr>
-          <p:cNvSpPr>
-            <a:spLocks noGrp="1"/>
-          </p:cNvSpPr>
-          <p:nvPr>
-            <p:ph type="title"/>
-          </p:nvPr>
-        </p:nvSpPr>
-        <p:spPr/>
-        <p:txBody>
-          <a:bodyPr/>
-          <a:lstStyle/>
-          <a:p>
-            <a:r>
-              <a:rPr lang="en-US" dirty="0"/>
-              <a:t>Gated Linear Units</a:t>
-            </a:r>
-          </a:p>
-        </p:txBody>
-      </p:sp>
-      <p:sp>
-        <p:nvSpPr>
-          <p:cNvPr id="3" name="Content Placeholder 2">
-            <a:extLst>
-              <a:ext uri="{FF2B5EF4-FFF2-40B4-BE49-F238E27FC236}">
-                <a16:creationId xmlns:a16="http://schemas.microsoft.com/office/drawing/2014/main" id="{2E437F91-8A21-BED3-D4DB-CAA902D2C6E6}"/>
-              </a:ext>
-            </a:extLst>
-          </p:cNvPr>
-          <p:cNvSpPr>
-            <a:spLocks noGrp="1"/>
-          </p:cNvSpPr>
-          <p:nvPr>
-            <p:ph idx="1"/>
-          </p:nvPr>
-        </p:nvSpPr>
-        <p:spPr/>
-        <p:txBody>
-          <a:bodyPr/>
-          <a:lstStyle/>
-          <a:p>
-            <a:endParaRPr lang="en-US"/>
-          </a:p>
-        </p:txBody>
-      </p:sp>
-    </p:spTree>
-    <p:extLst>
-      <p:ext uri="{BB962C8B-B14F-4D97-AF65-F5344CB8AC3E}">
-        <p14:creationId xmlns:p14="http://schemas.microsoft.com/office/powerpoint/2010/main" val="1182844693"/>
-      </p:ext>
-    </p:extLst>
-  </p:cSld>
-  <p:clrMapOvr>
-    <a:masterClrMapping/>
-  </p:clrMapOvr>
-</p:sld>
-</file>
-
-<file path=ppt/slides/slide5.xml><?xml version="1.0" encoding="utf-8"?>
-<p:sld xmlns:a="http://schemas.openxmlformats.org/drawingml/2006/main" xmlns:r="http://schemas.openxmlformats.org/officeDocument/2006/relationships" xmlns:p="http://schemas.openxmlformats.org/presentationml/2006/main">
-  <p:cSld>
-    <p:spTree>
-      <p:nvGrpSpPr>
-        <p:cNvPr id="1" name=""/>
-        <p:cNvGrpSpPr/>
-        <p:nvPr/>
-      </p:nvGrpSpPr>
-      <p:grpSpPr>
-        <a:xfrm>
-          <a:off x="0" y="0"/>
-          <a:ext cx="0" cy="0"/>
-          <a:chOff x="0" y="0"/>
-          <a:chExt cx="0" cy="0"/>
-        </a:xfrm>
-      </p:grpSpPr>
-      <p:sp>
-        <p:nvSpPr>
-          <p:cNvPr id="2" name="Title 1">
-            <a:extLst>
-              <a:ext uri="{FF2B5EF4-FFF2-40B4-BE49-F238E27FC236}">
-                <a16:creationId xmlns:a16="http://schemas.microsoft.com/office/drawing/2014/main" id="{0ACB5061-E020-63A8-F29D-9B8414E7F4DF}"/>
-              </a:ext>
-            </a:extLst>
-          </p:cNvPr>
-          <p:cNvSpPr>
-            <a:spLocks noGrp="1"/>
-          </p:cNvSpPr>
-          <p:nvPr>
-            <p:ph type="title"/>
-          </p:nvPr>
-        </p:nvSpPr>
-        <p:spPr/>
-        <p:txBody>
-          <a:bodyPr/>
-          <a:lstStyle/>
-          <a:p>
-            <a:r>
-              <a:rPr lang="en-US" dirty="0"/>
-              <a:t>Expanded Activation</a:t>
-            </a:r>
-          </a:p>
-        </p:txBody>
-      </p:sp>
-      <p:sp>
-        <p:nvSpPr>
-          <p:cNvPr id="3" name="Content Placeholder 2">
-            <a:extLst>
-              <a:ext uri="{FF2B5EF4-FFF2-40B4-BE49-F238E27FC236}">
-                <a16:creationId xmlns:a16="http://schemas.microsoft.com/office/drawing/2014/main" id="{0A34F9FC-C186-432D-A309-5AE1180242F7}"/>
-              </a:ext>
-            </a:extLst>
-          </p:cNvPr>
-          <p:cNvSpPr>
-            <a:spLocks noGrp="1"/>
-          </p:cNvSpPr>
-          <p:nvPr>
-            <p:ph idx="1"/>
-          </p:nvPr>
-        </p:nvSpPr>
-        <p:spPr/>
-        <p:txBody>
-          <a:bodyPr/>
-          <a:lstStyle/>
-          <a:p>
-            <a:endParaRPr lang="en-US"/>
-          </a:p>
-        </p:txBody>
-      </p:sp>
-    </p:spTree>
-    <p:extLst>
-      <p:ext uri="{BB962C8B-B14F-4D97-AF65-F5344CB8AC3E}">
-        <p14:creationId xmlns:p14="http://schemas.microsoft.com/office/powerpoint/2010/main" val="4054262739"/>
-      </p:ext>
-    </p:extLst>
-  </p:cSld>
-  <p:clrMapOvr>
-    <a:masterClrMapping/>
-  </p:clrMapOvr>
-</p:sld>
-</file>
-
-<file path=ppt/slides/slide6.xml><?xml version="1.0" encoding="utf-8"?>
-<p:sld xmlns:a="http://schemas.openxmlformats.org/drawingml/2006/main" xmlns:r="http://schemas.openxmlformats.org/officeDocument/2006/relationships" xmlns:p="http://schemas.openxmlformats.org/presentationml/2006/main">
-  <p:cSld>
-    <p:spTree>
-      <p:nvGrpSpPr>
-        <p:cNvPr id="1" name=""/>
-        <p:cNvGrpSpPr/>
-        <p:nvPr/>
-      </p:nvGrpSpPr>
-      <p:grpSpPr>
-        <a:xfrm>
-          <a:off x="0" y="0"/>
-          <a:ext cx="0" cy="0"/>
-          <a:chOff x="0" y="0"/>
-          <a:chExt cx="0" cy="0"/>
-        </a:xfrm>
-      </p:grpSpPr>
-      <p:sp>
-        <p:nvSpPr>
-          <p:cNvPr id="2" name="Title 1">
-            <a:extLst>
-              <a:ext uri="{FF2B5EF4-FFF2-40B4-BE49-F238E27FC236}">
-                <a16:creationId xmlns:a16="http://schemas.microsoft.com/office/drawing/2014/main" id="{205C2350-3AD0-E288-926F-DE2A5498CCE4}"/>
-              </a:ext>
-            </a:extLst>
-          </p:cNvPr>
-          <p:cNvSpPr>
-            <a:spLocks noGrp="1"/>
-          </p:cNvSpPr>
-          <p:nvPr>
-            <p:ph type="title"/>
-          </p:nvPr>
-        </p:nvSpPr>
-        <p:spPr/>
-        <p:txBody>
-          <a:bodyPr/>
-          <a:lstStyle/>
-          <a:p>
-            <a:r>
-              <a:rPr lang="en-US" dirty="0" err="1"/>
-              <a:t>ReZero</a:t>
-            </a:r>
-            <a:endParaRPr lang="en-US" dirty="0"/>
-          </a:p>
-        </p:txBody>
-      </p:sp>
-    </p:spTree>
-    <p:extLst>
-      <p:ext uri="{BB962C8B-B14F-4D97-AF65-F5344CB8AC3E}">
-        <p14:creationId xmlns:p14="http://schemas.microsoft.com/office/powerpoint/2010/main" val="4043992591"/>
-      </p:ext>
-    </p:extLst>
-  </p:cSld>
-  <p:clrMapOvr>
-    <a:masterClrMapping/>
-  </p:clrMapOvr>
-</p:sld>
-</file>
-
-<file path=ppt/slides/slide7.xml><?xml version="1.0" encoding="utf-8"?>
-<p:sld xmlns:a="http://schemas.openxmlformats.org/drawingml/2006/main" xmlns:r="http://schemas.openxmlformats.org/officeDocument/2006/relationships" xmlns:p="http://schemas.openxmlformats.org/presentationml/2006/main">
-  <p:cSld>
-    <p:spTree>
-      <p:nvGrpSpPr>
-        <p:cNvPr id="1" name=""/>
-        <p:cNvGrpSpPr/>
-        <p:nvPr/>
-      </p:nvGrpSpPr>
-      <p:grpSpPr>
-        <a:xfrm>
-          <a:off x="0" y="0"/>
-          <a:ext cx="0" cy="0"/>
-          <a:chOff x="0" y="0"/>
-          <a:chExt cx="0" cy="0"/>
-        </a:xfrm>
-      </p:grpSpPr>
-      <p:sp>
-        <p:nvSpPr>
-          <p:cNvPr id="2" name="Title 1">
-            <a:extLst>
-              <a:ext uri="{FF2B5EF4-FFF2-40B4-BE49-F238E27FC236}">
-                <a16:creationId xmlns:a16="http://schemas.microsoft.com/office/drawing/2014/main" id="{8F851273-9B86-9301-8CAD-B1EE8479F718}"/>
-              </a:ext>
-            </a:extLst>
-          </p:cNvPr>
-          <p:cNvSpPr>
-            <a:spLocks noGrp="1"/>
-          </p:cNvSpPr>
-          <p:nvPr>
-            <p:ph type="title"/>
-          </p:nvPr>
-        </p:nvSpPr>
-        <p:spPr/>
-        <p:txBody>
-          <a:bodyPr/>
-          <a:lstStyle/>
-          <a:p>
-            <a:r>
-              <a:rPr lang="en-US" dirty="0"/>
-              <a:t>Rotary</a:t>
-            </a:r>
-          </a:p>
-        </p:txBody>
-      </p:sp>
-      <p:sp>
-        <p:nvSpPr>
-          <p:cNvPr id="47" name="Rectangle: Rounded Corners 46">
-            <a:extLst>
-              <a:ext uri="{FF2B5EF4-FFF2-40B4-BE49-F238E27FC236}">
-                <a16:creationId xmlns:a16="http://schemas.microsoft.com/office/drawing/2014/main" id="{91C19C99-DCFA-E7F2-08F3-7F948221D47D}"/>
+          <p:cNvPr id="99" name="Rectangle: Rounded Corners 98">
+            <a:extLst>
+              <a:ext uri="{FF2B5EF4-FFF2-40B4-BE49-F238E27FC236}">
+                <a16:creationId xmlns:a16="http://schemas.microsoft.com/office/drawing/2014/main" id="{AAD83D33-2487-DF3C-5E65-859DBBF9A8AD}"/>
               </a:ext>
             </a:extLst>
           </p:cNvPr>
@@ -5989,10 +5655,10 @@
       </p:sp>
       <p:sp>
         <p:nvSpPr>
-          <p:cNvPr id="48" name="Rectangle: Rounded Corners 47">
-            <a:extLst>
-              <a:ext uri="{FF2B5EF4-FFF2-40B4-BE49-F238E27FC236}">
-                <a16:creationId xmlns:a16="http://schemas.microsoft.com/office/drawing/2014/main" id="{878B0FA6-C9DD-F7A1-AD94-3A8F96B10EA9}"/>
+          <p:cNvPr id="100" name="Rectangle: Rounded Corners 99">
+            <a:extLst>
+              <a:ext uri="{FF2B5EF4-FFF2-40B4-BE49-F238E27FC236}">
+                <a16:creationId xmlns:a16="http://schemas.microsoft.com/office/drawing/2014/main" id="{47192E24-FD30-BE16-F7D9-07EFD6DF3845}"/>
               </a:ext>
             </a:extLst>
           </p:cNvPr>
@@ -6046,10 +5712,10 @@
       </p:sp>
       <p:sp>
         <p:nvSpPr>
-          <p:cNvPr id="49" name="TextBox 48">
-            <a:extLst>
-              <a:ext uri="{FF2B5EF4-FFF2-40B4-BE49-F238E27FC236}">
-                <a16:creationId xmlns:a16="http://schemas.microsoft.com/office/drawing/2014/main" id="{3EA5B913-D08B-46EE-0D0A-87C59115D379}"/>
+          <p:cNvPr id="101" name="TextBox 100">
+            <a:extLst>
+              <a:ext uri="{FF2B5EF4-FFF2-40B4-BE49-F238E27FC236}">
+                <a16:creationId xmlns:a16="http://schemas.microsoft.com/office/drawing/2014/main" id="{FCD1D19A-CF8E-C580-FC6C-D3189F7AC62D}"/>
               </a:ext>
             </a:extLst>
           </p:cNvPr>
@@ -6082,10 +5748,10 @@
       </p:sp>
       <p:sp>
         <p:nvSpPr>
-          <p:cNvPr id="50" name="Rectangle: Rounded Corners 49">
-            <a:extLst>
-              <a:ext uri="{FF2B5EF4-FFF2-40B4-BE49-F238E27FC236}">
-                <a16:creationId xmlns:a16="http://schemas.microsoft.com/office/drawing/2014/main" id="{5368B065-B206-6653-9EDC-442EF4EABF15}"/>
+          <p:cNvPr id="102" name="Rectangle: Rounded Corners 101">
+            <a:extLst>
+              <a:ext uri="{FF2B5EF4-FFF2-40B4-BE49-F238E27FC236}">
+                <a16:creationId xmlns:a16="http://schemas.microsoft.com/office/drawing/2014/main" id="{7890C9CA-6464-F309-9732-AAE6BEB10996}"/>
               </a:ext>
             </a:extLst>
           </p:cNvPr>
@@ -6134,10 +5800,10 @@
       </p:sp>
       <p:sp>
         <p:nvSpPr>
-          <p:cNvPr id="51" name="TextBox 50">
-            <a:extLst>
-              <a:ext uri="{FF2B5EF4-FFF2-40B4-BE49-F238E27FC236}">
-                <a16:creationId xmlns:a16="http://schemas.microsoft.com/office/drawing/2014/main" id="{9C6BA9CC-A48E-8F1A-96D6-FBC138F42242}"/>
+          <p:cNvPr id="103" name="TextBox 102">
+            <a:extLst>
+              <a:ext uri="{FF2B5EF4-FFF2-40B4-BE49-F238E27FC236}">
+                <a16:creationId xmlns:a16="http://schemas.microsoft.com/office/drawing/2014/main" id="{0F28D88B-B605-394B-A918-C22F33584989}"/>
               </a:ext>
             </a:extLst>
           </p:cNvPr>
@@ -6170,17 +5836,17 @@
       </p:sp>
       <p:cxnSp>
         <p:nvCxnSpPr>
-          <p:cNvPr id="52" name="Straight Arrow Connector 51">
-            <a:extLst>
-              <a:ext uri="{FF2B5EF4-FFF2-40B4-BE49-F238E27FC236}">
-                <a16:creationId xmlns:a16="http://schemas.microsoft.com/office/drawing/2014/main" id="{4ACF1389-EC33-C5BF-1DE1-95820FA505C5}"/>
+          <p:cNvPr id="104" name="Straight Arrow Connector 103">
+            <a:extLst>
+              <a:ext uri="{FF2B5EF4-FFF2-40B4-BE49-F238E27FC236}">
+                <a16:creationId xmlns:a16="http://schemas.microsoft.com/office/drawing/2014/main" id="{77ACFA61-3548-B7FE-C93D-213F2A515F81}"/>
               </a:ext>
             </a:extLst>
           </p:cNvPr>
           <p:cNvCxnSpPr>
             <a:cxnSpLocks/>
-            <a:stCxn id="48" idx="0"/>
-            <a:endCxn id="50" idx="2"/>
+            <a:stCxn id="100" idx="0"/>
+            <a:endCxn id="102" idx="2"/>
           </p:cNvCxnSpPr>
           <p:nvPr/>
         </p:nvCxnSpPr>
@@ -6216,10 +5882,10 @@
       </p:cxnSp>
       <p:sp>
         <p:nvSpPr>
-          <p:cNvPr id="53" name="Rectangle: Rounded Corners 52">
-            <a:extLst>
-              <a:ext uri="{FF2B5EF4-FFF2-40B4-BE49-F238E27FC236}">
-                <a16:creationId xmlns:a16="http://schemas.microsoft.com/office/drawing/2014/main" id="{115F6149-1797-5220-5657-56DB6F555692}"/>
+          <p:cNvPr id="105" name="Rectangle: Rounded Corners 104">
+            <a:extLst>
+              <a:ext uri="{FF2B5EF4-FFF2-40B4-BE49-F238E27FC236}">
+                <a16:creationId xmlns:a16="http://schemas.microsoft.com/office/drawing/2014/main" id="{C7033450-BFE0-86BD-28FE-03CCA78ADAFB}"/>
               </a:ext>
             </a:extLst>
           </p:cNvPr>
@@ -6265,10 +5931,10 @@
       </p:sp>
       <p:sp>
         <p:nvSpPr>
-          <p:cNvPr id="54" name="TextBox 53">
-            <a:extLst>
-              <a:ext uri="{FF2B5EF4-FFF2-40B4-BE49-F238E27FC236}">
-                <a16:creationId xmlns:a16="http://schemas.microsoft.com/office/drawing/2014/main" id="{22A8FBB3-80BB-0877-70F7-762F4EC98E9D}"/>
+          <p:cNvPr id="106" name="TextBox 105">
+            <a:extLst>
+              <a:ext uri="{FF2B5EF4-FFF2-40B4-BE49-F238E27FC236}">
+                <a16:creationId xmlns:a16="http://schemas.microsoft.com/office/drawing/2014/main" id="{2C06A4E6-6FA4-5BE1-954B-EB633BF15DB2}"/>
               </a:ext>
             </a:extLst>
           </p:cNvPr>
@@ -6294,22 +5960,22 @@
             <a:pPr algn="ctr"/>
             <a:r>
               <a:rPr lang="en-US" dirty="0"/>
-              <a:t>Self Attention</a:t>
+              <a:t>MHA</a:t>
             </a:r>
           </a:p>
         </p:txBody>
       </p:sp>
       <p:cxnSp>
         <p:nvCxnSpPr>
-          <p:cNvPr id="55" name="Straight Connector 54">
-            <a:extLst>
-              <a:ext uri="{FF2B5EF4-FFF2-40B4-BE49-F238E27FC236}">
-                <a16:creationId xmlns:a16="http://schemas.microsoft.com/office/drawing/2014/main" id="{CE57B08F-9FA5-1C40-5175-40E54E07BC70}"/>
+          <p:cNvPr id="107" name="Straight Connector 106">
+            <a:extLst>
+              <a:ext uri="{FF2B5EF4-FFF2-40B4-BE49-F238E27FC236}">
+                <a16:creationId xmlns:a16="http://schemas.microsoft.com/office/drawing/2014/main" id="{00594006-7DB4-CC76-FA10-B221533CDB1F}"/>
               </a:ext>
             </a:extLst>
           </p:cNvPr>
           <p:cNvCxnSpPr>
-            <a:stCxn id="50" idx="0"/>
+            <a:stCxn id="102" idx="0"/>
           </p:cNvCxnSpPr>
           <p:nvPr/>
         </p:nvCxnSpPr>
@@ -6339,10 +6005,10 @@
       </p:cxnSp>
       <p:cxnSp>
         <p:nvCxnSpPr>
-          <p:cNvPr id="56" name="Straight Connector 55">
-            <a:extLst>
-              <a:ext uri="{FF2B5EF4-FFF2-40B4-BE49-F238E27FC236}">
-                <a16:creationId xmlns:a16="http://schemas.microsoft.com/office/drawing/2014/main" id="{7A827B07-B5B4-BFD2-3C21-05F73FEEAE19}"/>
+          <p:cNvPr id="108" name="Straight Connector 107">
+            <a:extLst>
+              <a:ext uri="{FF2B5EF4-FFF2-40B4-BE49-F238E27FC236}">
+                <a16:creationId xmlns:a16="http://schemas.microsoft.com/office/drawing/2014/main" id="{BCDAE43F-31B2-62DE-5385-74E676FC2872}"/>
               </a:ext>
             </a:extLst>
           </p:cNvPr>
@@ -6377,10 +6043,10 @@
       </p:cxnSp>
       <p:cxnSp>
         <p:nvCxnSpPr>
-          <p:cNvPr id="57" name="Straight Arrow Connector 56">
-            <a:extLst>
-              <a:ext uri="{FF2B5EF4-FFF2-40B4-BE49-F238E27FC236}">
-                <a16:creationId xmlns:a16="http://schemas.microsoft.com/office/drawing/2014/main" id="{A0118B78-F0E7-C6F9-FEF8-16A3C220F850}"/>
+          <p:cNvPr id="109" name="Straight Arrow Connector 108">
+            <a:extLst>
+              <a:ext uri="{FF2B5EF4-FFF2-40B4-BE49-F238E27FC236}">
+                <a16:creationId xmlns:a16="http://schemas.microsoft.com/office/drawing/2014/main" id="{1A1446C5-B805-20DC-E4E7-F1261530EF68}"/>
               </a:ext>
             </a:extLst>
           </p:cNvPr>
@@ -6421,10 +6087,10 @@
       </p:cxnSp>
       <p:cxnSp>
         <p:nvCxnSpPr>
-          <p:cNvPr id="58" name="Straight Arrow Connector 57">
-            <a:extLst>
-              <a:ext uri="{FF2B5EF4-FFF2-40B4-BE49-F238E27FC236}">
-                <a16:creationId xmlns:a16="http://schemas.microsoft.com/office/drawing/2014/main" id="{57037AC7-E00E-21B0-4D68-5178F1003906}"/>
+          <p:cNvPr id="110" name="Straight Arrow Connector 109">
+            <a:extLst>
+              <a:ext uri="{FF2B5EF4-FFF2-40B4-BE49-F238E27FC236}">
+                <a16:creationId xmlns:a16="http://schemas.microsoft.com/office/drawing/2014/main" id="{C572F37A-684A-CDCA-A03E-A2D9DC8400BA}"/>
               </a:ext>
             </a:extLst>
           </p:cNvPr>
@@ -6465,10 +6131,10 @@
       </p:cxnSp>
       <p:cxnSp>
         <p:nvCxnSpPr>
-          <p:cNvPr id="59" name="Straight Arrow Connector 58">
-            <a:extLst>
-              <a:ext uri="{FF2B5EF4-FFF2-40B4-BE49-F238E27FC236}">
-                <a16:creationId xmlns:a16="http://schemas.microsoft.com/office/drawing/2014/main" id="{068B435F-774A-37A9-5A3C-F232FFBB7213}"/>
+          <p:cNvPr id="111" name="Straight Arrow Connector 110">
+            <a:extLst>
+              <a:ext uri="{FF2B5EF4-FFF2-40B4-BE49-F238E27FC236}">
+                <a16:creationId xmlns:a16="http://schemas.microsoft.com/office/drawing/2014/main" id="{B7F21F3C-6EA9-B311-5119-DE4A760D7617}"/>
               </a:ext>
             </a:extLst>
           </p:cNvPr>
@@ -6509,10 +6175,10 @@
       </p:cxnSp>
       <p:sp>
         <p:nvSpPr>
-          <p:cNvPr id="60" name="Rectangle: Rounded Corners 59">
-            <a:extLst>
-              <a:ext uri="{FF2B5EF4-FFF2-40B4-BE49-F238E27FC236}">
-                <a16:creationId xmlns:a16="http://schemas.microsoft.com/office/drawing/2014/main" id="{1664AE7E-9D2B-544D-B2FE-506DE454A27D}"/>
+          <p:cNvPr id="112" name="Rectangle: Rounded Corners 111">
+            <a:extLst>
+              <a:ext uri="{FF2B5EF4-FFF2-40B4-BE49-F238E27FC236}">
+                <a16:creationId xmlns:a16="http://schemas.microsoft.com/office/drawing/2014/main" id="{391B1CDE-E61D-3A3C-D6E8-07CE501953AB}"/>
               </a:ext>
             </a:extLst>
           </p:cNvPr>
@@ -6561,10 +6227,10 @@
       </p:sp>
       <p:sp>
         <p:nvSpPr>
-          <p:cNvPr id="61" name="TextBox 60">
-            <a:extLst>
-              <a:ext uri="{FF2B5EF4-FFF2-40B4-BE49-F238E27FC236}">
-                <a16:creationId xmlns:a16="http://schemas.microsoft.com/office/drawing/2014/main" id="{E5C40924-631D-4770-8913-0638142CE64E}"/>
+          <p:cNvPr id="113" name="TextBox 112">
+            <a:extLst>
+              <a:ext uri="{FF2B5EF4-FFF2-40B4-BE49-F238E27FC236}">
+                <a16:creationId xmlns:a16="http://schemas.microsoft.com/office/drawing/2014/main" id="{50A1C4F1-5CF8-0AEF-1023-BBCD480EEC9A}"/>
               </a:ext>
             </a:extLst>
           </p:cNvPr>
@@ -6597,10 +6263,10 @@
       </p:sp>
       <p:sp>
         <p:nvSpPr>
-          <p:cNvPr id="62" name="Rectangle: Rounded Corners 61">
-            <a:extLst>
-              <a:ext uri="{FF2B5EF4-FFF2-40B4-BE49-F238E27FC236}">
-                <a16:creationId xmlns:a16="http://schemas.microsoft.com/office/drawing/2014/main" id="{B0B31591-EE82-3CC3-928E-5F5B599C8B29}"/>
+          <p:cNvPr id="114" name="Rectangle: Rounded Corners 113">
+            <a:extLst>
+              <a:ext uri="{FF2B5EF4-FFF2-40B4-BE49-F238E27FC236}">
+                <a16:creationId xmlns:a16="http://schemas.microsoft.com/office/drawing/2014/main" id="{FDE7CBB3-ED37-9A6E-46DC-2E858392E036}"/>
               </a:ext>
             </a:extLst>
           </p:cNvPr>
@@ -6646,10 +6312,10 @@
       </p:sp>
       <p:sp>
         <p:nvSpPr>
-          <p:cNvPr id="63" name="TextBox 62">
-            <a:extLst>
-              <a:ext uri="{FF2B5EF4-FFF2-40B4-BE49-F238E27FC236}">
-                <a16:creationId xmlns:a16="http://schemas.microsoft.com/office/drawing/2014/main" id="{8C04D672-0C54-3141-1288-0DDB772B03C3}"/>
+          <p:cNvPr id="115" name="TextBox 114">
+            <a:extLst>
+              <a:ext uri="{FF2B5EF4-FFF2-40B4-BE49-F238E27FC236}">
+                <a16:creationId xmlns:a16="http://schemas.microsoft.com/office/drawing/2014/main" id="{356A370B-2052-8DBC-541A-BF39DA436C9B}"/>
               </a:ext>
             </a:extLst>
           </p:cNvPr>
@@ -6674,26 +6340,25 @@
           <a:p>
             <a:pPr algn="ctr"/>
             <a:r>
-              <a:rPr lang="en-US" dirty="0" err="1"/>
-              <a:t>SwiGLU</a:t>
-            </a:r>
-            <a:endParaRPr lang="en-US" dirty="0"/>
+              <a:rPr lang="en-US" dirty="0"/>
+              <a:t>GEGLU</a:t>
+            </a:r>
           </a:p>
         </p:txBody>
       </p:sp>
       <p:cxnSp>
         <p:nvCxnSpPr>
-          <p:cNvPr id="64" name="Straight Arrow Connector 63">
-            <a:extLst>
-              <a:ext uri="{FF2B5EF4-FFF2-40B4-BE49-F238E27FC236}">
-                <a16:creationId xmlns:a16="http://schemas.microsoft.com/office/drawing/2014/main" id="{EB9978DC-711D-40F4-77F0-972EBE5BA39F}"/>
+          <p:cNvPr id="116" name="Straight Arrow Connector 115">
+            <a:extLst>
+              <a:ext uri="{FF2B5EF4-FFF2-40B4-BE49-F238E27FC236}">
+                <a16:creationId xmlns:a16="http://schemas.microsoft.com/office/drawing/2014/main" id="{307EBFCA-B521-827A-7BE1-0A45FE8AE2DE}"/>
               </a:ext>
             </a:extLst>
           </p:cNvPr>
           <p:cNvCxnSpPr>
             <a:cxnSpLocks/>
-            <a:stCxn id="53" idx="0"/>
-            <a:endCxn id="60" idx="2"/>
+            <a:stCxn id="105" idx="0"/>
+            <a:endCxn id="112" idx="2"/>
           </p:cNvCxnSpPr>
           <p:nvPr/>
         </p:nvCxnSpPr>
@@ -6726,10 +6391,10 @@
       </p:cxnSp>
       <p:cxnSp>
         <p:nvCxnSpPr>
-          <p:cNvPr id="65" name="Straight Arrow Connector 64">
-            <a:extLst>
-              <a:ext uri="{FF2B5EF4-FFF2-40B4-BE49-F238E27FC236}">
-                <a16:creationId xmlns:a16="http://schemas.microsoft.com/office/drawing/2014/main" id="{66A0F537-2ACA-CE73-5DCB-9DD261D61947}"/>
+          <p:cNvPr id="117" name="Straight Arrow Connector 116">
+            <a:extLst>
+              <a:ext uri="{FF2B5EF4-FFF2-40B4-BE49-F238E27FC236}">
+                <a16:creationId xmlns:a16="http://schemas.microsoft.com/office/drawing/2014/main" id="{94666B96-5C7E-EEE5-33C3-EB42FEF92D99}"/>
               </a:ext>
             </a:extLst>
           </p:cNvPr>
@@ -6767,10 +6432,10 @@
       </p:cxnSp>
       <p:sp>
         <p:nvSpPr>
-          <p:cNvPr id="66" name="Oval 65">
-            <a:extLst>
-              <a:ext uri="{FF2B5EF4-FFF2-40B4-BE49-F238E27FC236}">
-                <a16:creationId xmlns:a16="http://schemas.microsoft.com/office/drawing/2014/main" id="{83319994-F9BD-0F91-AD7E-1004F4704D96}"/>
+          <p:cNvPr id="118" name="Oval 117">
+            <a:extLst>
+              <a:ext uri="{FF2B5EF4-FFF2-40B4-BE49-F238E27FC236}">
+                <a16:creationId xmlns:a16="http://schemas.microsoft.com/office/drawing/2014/main" id="{F06133D7-E9EB-3CE4-38DE-2CC5BDC0BD9E}"/>
               </a:ext>
             </a:extLst>
           </p:cNvPr>
@@ -6814,10 +6479,10 @@
       </p:sp>
       <p:sp>
         <p:nvSpPr>
-          <p:cNvPr id="67" name="Freeform: Shape 66">
-            <a:extLst>
-              <a:ext uri="{FF2B5EF4-FFF2-40B4-BE49-F238E27FC236}">
-                <a16:creationId xmlns:a16="http://schemas.microsoft.com/office/drawing/2014/main" id="{EAAE16CA-058D-865B-72DD-4349BD15D7A4}"/>
+          <p:cNvPr id="119" name="Freeform: Shape 118">
+            <a:extLst>
+              <a:ext uri="{FF2B5EF4-FFF2-40B4-BE49-F238E27FC236}">
+                <a16:creationId xmlns:a16="http://schemas.microsoft.com/office/drawing/2014/main" id="{D8535F48-984D-FD3A-7B8D-F4AF18D98871}"/>
               </a:ext>
             </a:extLst>
           </p:cNvPr>
@@ -6909,10 +6574,10 @@
       </p:sp>
       <p:sp>
         <p:nvSpPr>
-          <p:cNvPr id="68" name="Oval 67">
-            <a:extLst>
-              <a:ext uri="{FF2B5EF4-FFF2-40B4-BE49-F238E27FC236}">
-                <a16:creationId xmlns:a16="http://schemas.microsoft.com/office/drawing/2014/main" id="{B9924E5F-7165-CA3F-65BC-D5688175DBE7}"/>
+          <p:cNvPr id="120" name="Oval 119">
+            <a:extLst>
+              <a:ext uri="{FF2B5EF4-FFF2-40B4-BE49-F238E27FC236}">
+                <a16:creationId xmlns:a16="http://schemas.microsoft.com/office/drawing/2014/main" id="{6865388D-EB37-2743-688A-F2470631070E}"/>
               </a:ext>
             </a:extLst>
           </p:cNvPr>
@@ -6956,10 +6621,10 @@
       </p:sp>
       <p:sp>
         <p:nvSpPr>
-          <p:cNvPr id="69" name="Freeform: Shape 68">
-            <a:extLst>
-              <a:ext uri="{FF2B5EF4-FFF2-40B4-BE49-F238E27FC236}">
-                <a16:creationId xmlns:a16="http://schemas.microsoft.com/office/drawing/2014/main" id="{AB47E292-8CBD-2887-45D8-9F9AF87FAED3}"/>
+          <p:cNvPr id="121" name="Freeform: Shape 120">
+            <a:extLst>
+              <a:ext uri="{FF2B5EF4-FFF2-40B4-BE49-F238E27FC236}">
+                <a16:creationId xmlns:a16="http://schemas.microsoft.com/office/drawing/2014/main" id="{B3DEDB23-A988-1F84-1EF9-2816E41CF299}"/>
               </a:ext>
             </a:extLst>
           </p:cNvPr>
@@ -7051,10 +6716,10 @@
       </p:sp>
       <p:sp>
         <p:nvSpPr>
-          <p:cNvPr id="70" name="TextBox 69">
-            <a:extLst>
-              <a:ext uri="{FF2B5EF4-FFF2-40B4-BE49-F238E27FC236}">
-                <a16:creationId xmlns:a16="http://schemas.microsoft.com/office/drawing/2014/main" id="{4A416DCE-D664-655E-4ED9-97629CF36471}"/>
+          <p:cNvPr id="122" name="TextBox 121">
+            <a:extLst>
+              <a:ext uri="{FF2B5EF4-FFF2-40B4-BE49-F238E27FC236}">
+                <a16:creationId xmlns:a16="http://schemas.microsoft.com/office/drawing/2014/main" id="{0A325D25-BD43-23BD-497B-BF153712FAA3}"/>
               </a:ext>
             </a:extLst>
           </p:cNvPr>
@@ -7086,10 +6751,10 @@
       </p:sp>
       <p:sp>
         <p:nvSpPr>
-          <p:cNvPr id="71" name="TextBox 70">
-            <a:extLst>
-              <a:ext uri="{FF2B5EF4-FFF2-40B4-BE49-F238E27FC236}">
-                <a16:creationId xmlns:a16="http://schemas.microsoft.com/office/drawing/2014/main" id="{C1AD2763-A5BA-CBE6-10A1-03458C89EF57}"/>
+          <p:cNvPr id="123" name="TextBox 122">
+            <a:extLst>
+              <a:ext uri="{FF2B5EF4-FFF2-40B4-BE49-F238E27FC236}">
+                <a16:creationId xmlns:a16="http://schemas.microsoft.com/office/drawing/2014/main" id="{764D84EA-92C5-5364-D27B-6EEC71201071}"/>
               </a:ext>
             </a:extLst>
           </p:cNvPr>
@@ -7121,10 +6786,10 @@
       </p:sp>
       <p:sp>
         <p:nvSpPr>
-          <p:cNvPr id="72" name="TextBox 71">
-            <a:extLst>
-              <a:ext uri="{FF2B5EF4-FFF2-40B4-BE49-F238E27FC236}">
-                <a16:creationId xmlns:a16="http://schemas.microsoft.com/office/drawing/2014/main" id="{BFCE2A3A-57A0-885C-DFB6-CA1EFD5FEC99}"/>
+          <p:cNvPr id="124" name="TextBox 123">
+            <a:extLst>
+              <a:ext uri="{FF2B5EF4-FFF2-40B4-BE49-F238E27FC236}">
+                <a16:creationId xmlns:a16="http://schemas.microsoft.com/office/drawing/2014/main" id="{62DC2F99-3A4A-2B23-8AE8-3B0A632E8B08}"/>
               </a:ext>
             </a:extLst>
           </p:cNvPr>
@@ -7156,10 +6821,10 @@
       </p:sp>
       <p:cxnSp>
         <p:nvCxnSpPr>
-          <p:cNvPr id="73" name="Straight Arrow Connector 72">
-            <a:extLst>
-              <a:ext uri="{FF2B5EF4-FFF2-40B4-BE49-F238E27FC236}">
-                <a16:creationId xmlns:a16="http://schemas.microsoft.com/office/drawing/2014/main" id="{02B5371D-78E7-EBE5-04B3-0563201378B6}"/>
+          <p:cNvPr id="125" name="Straight Arrow Connector 124">
+            <a:extLst>
+              <a:ext uri="{FF2B5EF4-FFF2-40B4-BE49-F238E27FC236}">
+                <a16:creationId xmlns:a16="http://schemas.microsoft.com/office/drawing/2014/main" id="{D2CA485D-68F8-4FF1-BD9D-7434F2FC5F1C}"/>
               </a:ext>
             </a:extLst>
           </p:cNvPr>
@@ -7197,10 +6862,10 @@
       </p:cxnSp>
       <p:cxnSp>
         <p:nvCxnSpPr>
-          <p:cNvPr id="74" name="Connector: Elbow 73">
-            <a:extLst>
-              <a:ext uri="{FF2B5EF4-FFF2-40B4-BE49-F238E27FC236}">
-                <a16:creationId xmlns:a16="http://schemas.microsoft.com/office/drawing/2014/main" id="{0F8552B0-E466-5A5B-9B8F-2E57E4D2144D}"/>
+          <p:cNvPr id="126" name="Connector: Elbow 125">
+            <a:extLst>
+              <a:ext uri="{FF2B5EF4-FFF2-40B4-BE49-F238E27FC236}">
+                <a16:creationId xmlns:a16="http://schemas.microsoft.com/office/drawing/2014/main" id="{1E387521-ECA9-0EFA-7542-66C221A6EB71}"/>
               </a:ext>
             </a:extLst>
           </p:cNvPr>
@@ -7237,10 +6902,10 @@
       </p:cxnSp>
       <p:cxnSp>
         <p:nvCxnSpPr>
-          <p:cNvPr id="75" name="Straight Arrow Connector 74">
-            <a:extLst>
-              <a:ext uri="{FF2B5EF4-FFF2-40B4-BE49-F238E27FC236}">
-                <a16:creationId xmlns:a16="http://schemas.microsoft.com/office/drawing/2014/main" id="{CD7E1153-37C9-F8F6-E118-D355A82FAC25}"/>
+          <p:cNvPr id="127" name="Straight Arrow Connector 126">
+            <a:extLst>
+              <a:ext uri="{FF2B5EF4-FFF2-40B4-BE49-F238E27FC236}">
+                <a16:creationId xmlns:a16="http://schemas.microsoft.com/office/drawing/2014/main" id="{F44835B6-9BCC-6C71-6A4A-C03A37696262}"/>
               </a:ext>
             </a:extLst>
           </p:cNvPr>
@@ -7276,10 +6941,10 @@
       </p:cxnSp>
       <p:cxnSp>
         <p:nvCxnSpPr>
-          <p:cNvPr id="76" name="Connector: Elbow 75">
-            <a:extLst>
-              <a:ext uri="{FF2B5EF4-FFF2-40B4-BE49-F238E27FC236}">
-                <a16:creationId xmlns:a16="http://schemas.microsoft.com/office/drawing/2014/main" id="{2659A311-417F-C8D5-79A3-3C9929EADD91}"/>
+          <p:cNvPr id="128" name="Connector: Elbow 127">
+            <a:extLst>
+              <a:ext uri="{FF2B5EF4-FFF2-40B4-BE49-F238E27FC236}">
+                <a16:creationId xmlns:a16="http://schemas.microsoft.com/office/drawing/2014/main" id="{34A573C8-319A-399A-D198-46049E0E4A30}"/>
               </a:ext>
             </a:extLst>
           </p:cNvPr>
@@ -7316,10 +6981,10 @@
       </p:cxnSp>
       <p:cxnSp>
         <p:nvCxnSpPr>
-          <p:cNvPr id="77" name="Straight Arrow Connector 76">
-            <a:extLst>
-              <a:ext uri="{FF2B5EF4-FFF2-40B4-BE49-F238E27FC236}">
-                <a16:creationId xmlns:a16="http://schemas.microsoft.com/office/drawing/2014/main" id="{9505D795-3116-74A5-1C4F-D40A6CAD9E03}"/>
+          <p:cNvPr id="129" name="Straight Arrow Connector 128">
+            <a:extLst>
+              <a:ext uri="{FF2B5EF4-FFF2-40B4-BE49-F238E27FC236}">
+                <a16:creationId xmlns:a16="http://schemas.microsoft.com/office/drawing/2014/main" id="{5CA27B42-93AA-2FA0-0309-4E4A0292713F}"/>
               </a:ext>
             </a:extLst>
           </p:cNvPr>
@@ -7357,10 +7022,10 @@
       </p:cxnSp>
       <p:sp>
         <p:nvSpPr>
-          <p:cNvPr id="78" name="Plus Sign 77">
-            <a:extLst>
-              <a:ext uri="{FF2B5EF4-FFF2-40B4-BE49-F238E27FC236}">
-                <a16:creationId xmlns:a16="http://schemas.microsoft.com/office/drawing/2014/main" id="{5418572A-6A14-3316-6734-A38DE8E73B25}"/>
+          <p:cNvPr id="130" name="Plus Sign 129">
+            <a:extLst>
+              <a:ext uri="{FF2B5EF4-FFF2-40B4-BE49-F238E27FC236}">
+                <a16:creationId xmlns:a16="http://schemas.microsoft.com/office/drawing/2014/main" id="{80A9E3CE-5832-1F3F-DD04-F1F321956B8E}"/>
               </a:ext>
             </a:extLst>
           </p:cNvPr>
@@ -7406,10 +7071,10 @@
       </p:sp>
       <p:sp>
         <p:nvSpPr>
-          <p:cNvPr id="79" name="Plus Sign 78">
-            <a:extLst>
-              <a:ext uri="{FF2B5EF4-FFF2-40B4-BE49-F238E27FC236}">
-                <a16:creationId xmlns:a16="http://schemas.microsoft.com/office/drawing/2014/main" id="{50FC8CB2-4FAA-8506-E054-729CC3FA4D8A}"/>
+          <p:cNvPr id="131" name="Plus Sign 130">
+            <a:extLst>
+              <a:ext uri="{FF2B5EF4-FFF2-40B4-BE49-F238E27FC236}">
+                <a16:creationId xmlns:a16="http://schemas.microsoft.com/office/drawing/2014/main" id="{FBEC5038-A842-8B98-9C08-5BB4B6D215E5}"/>
               </a:ext>
             </a:extLst>
           </p:cNvPr>
@@ -7455,10 +7120,10 @@
       </p:sp>
       <p:sp>
         <p:nvSpPr>
-          <p:cNvPr id="80" name="Oval 79">
-            <a:extLst>
-              <a:ext uri="{FF2B5EF4-FFF2-40B4-BE49-F238E27FC236}">
-                <a16:creationId xmlns:a16="http://schemas.microsoft.com/office/drawing/2014/main" id="{48B296DB-2FC7-F767-927C-4BCD05318F7A}"/>
+          <p:cNvPr id="132" name="Oval 131">
+            <a:extLst>
+              <a:ext uri="{FF2B5EF4-FFF2-40B4-BE49-F238E27FC236}">
+                <a16:creationId xmlns:a16="http://schemas.microsoft.com/office/drawing/2014/main" id="{CDF54FB4-83A0-8EA8-3AD8-22BA4F24E4CD}"/>
               </a:ext>
             </a:extLst>
           </p:cNvPr>
@@ -7502,10 +7167,10 @@
       </p:sp>
       <p:sp>
         <p:nvSpPr>
-          <p:cNvPr id="81" name="Freeform: Shape 80">
-            <a:extLst>
-              <a:ext uri="{FF2B5EF4-FFF2-40B4-BE49-F238E27FC236}">
-                <a16:creationId xmlns:a16="http://schemas.microsoft.com/office/drawing/2014/main" id="{DA74BEF0-89C6-A89F-0C09-5535A6DAC0FE}"/>
+          <p:cNvPr id="133" name="Freeform: Shape 132">
+            <a:extLst>
+              <a:ext uri="{FF2B5EF4-FFF2-40B4-BE49-F238E27FC236}">
+                <a16:creationId xmlns:a16="http://schemas.microsoft.com/office/drawing/2014/main" id="{14E65158-E070-50D1-9096-B6F334C32C73}"/>
               </a:ext>
             </a:extLst>
           </p:cNvPr>
@@ -7597,10 +7262,10 @@
       </p:sp>
       <p:sp>
         <p:nvSpPr>
-          <p:cNvPr id="82" name="TextBox 81">
-            <a:extLst>
-              <a:ext uri="{FF2B5EF4-FFF2-40B4-BE49-F238E27FC236}">
-                <a16:creationId xmlns:a16="http://schemas.microsoft.com/office/drawing/2014/main" id="{69CE49CF-8598-5F62-6B89-AE3AB6EB3A33}"/>
+          <p:cNvPr id="134" name="TextBox 133">
+            <a:extLst>
+              <a:ext uri="{FF2B5EF4-FFF2-40B4-BE49-F238E27FC236}">
+                <a16:creationId xmlns:a16="http://schemas.microsoft.com/office/drawing/2014/main" id="{44E01D28-A7FF-7C8B-9C7B-2FE1058DE6BC}"/>
               </a:ext>
             </a:extLst>
           </p:cNvPr>
@@ -7632,10 +7297,10 @@
       </p:sp>
       <p:sp>
         <p:nvSpPr>
-          <p:cNvPr id="83" name="Plus Sign 82">
-            <a:extLst>
-              <a:ext uri="{FF2B5EF4-FFF2-40B4-BE49-F238E27FC236}">
-                <a16:creationId xmlns:a16="http://schemas.microsoft.com/office/drawing/2014/main" id="{326DD9EE-525A-AA8B-295B-6CF59C3D0EC7}"/>
+          <p:cNvPr id="135" name="Plus Sign 134">
+            <a:extLst>
+              <a:ext uri="{FF2B5EF4-FFF2-40B4-BE49-F238E27FC236}">
+                <a16:creationId xmlns:a16="http://schemas.microsoft.com/office/drawing/2014/main" id="{AFCCD734-770D-AF3C-FD78-E2E3BCB36A26}"/>
               </a:ext>
             </a:extLst>
           </p:cNvPr>
@@ -7681,10 +7346,10 @@
       </p:sp>
       <p:sp>
         <p:nvSpPr>
-          <p:cNvPr id="84" name="TextBox 83">
-            <a:extLst>
-              <a:ext uri="{FF2B5EF4-FFF2-40B4-BE49-F238E27FC236}">
-                <a16:creationId xmlns:a16="http://schemas.microsoft.com/office/drawing/2014/main" id="{6A254E78-1EB4-6B84-9026-DEC4EF84EB04}"/>
+          <p:cNvPr id="136" name="TextBox 135">
+            <a:extLst>
+              <a:ext uri="{FF2B5EF4-FFF2-40B4-BE49-F238E27FC236}">
+                <a16:creationId xmlns:a16="http://schemas.microsoft.com/office/drawing/2014/main" id="{2E73CBE7-B362-2DBC-0C82-BD4F4B4102E9}"/>
               </a:ext>
             </a:extLst>
           </p:cNvPr>
@@ -7716,10 +7381,10 @@
       </p:sp>
       <p:sp>
         <p:nvSpPr>
-          <p:cNvPr id="85" name="TextBox 84">
-            <a:extLst>
-              <a:ext uri="{FF2B5EF4-FFF2-40B4-BE49-F238E27FC236}">
-                <a16:creationId xmlns:a16="http://schemas.microsoft.com/office/drawing/2014/main" id="{DBC3E27B-1E4C-BD8D-D0F9-DE42DFE4BDCA}"/>
+          <p:cNvPr id="137" name="TextBox 136">
+            <a:extLst>
+              <a:ext uri="{FF2B5EF4-FFF2-40B4-BE49-F238E27FC236}">
+                <a16:creationId xmlns:a16="http://schemas.microsoft.com/office/drawing/2014/main" id="{961A24FD-33F6-F123-2A83-59D38262808F}"/>
               </a:ext>
             </a:extLst>
           </p:cNvPr>
@@ -7743,19 +7408,18 @@
           <a:lstStyle/>
           <a:p>
             <a:r>
-              <a:rPr lang="en-US" dirty="0" err="1"/>
+              <a:rPr lang="en-US" dirty="0"/>
               <a:t>Nx</a:t>
             </a:r>
-            <a:endParaRPr lang="en-US" dirty="0"/>
-          </a:p>
-        </p:txBody>
-      </p:sp>
-      <p:sp>
-        <p:nvSpPr>
-          <p:cNvPr id="86" name="Rectangle: Rounded Corners 85">
-            <a:extLst>
-              <a:ext uri="{FF2B5EF4-FFF2-40B4-BE49-F238E27FC236}">
-                <a16:creationId xmlns:a16="http://schemas.microsoft.com/office/drawing/2014/main" id="{48466696-AF5E-43C3-D178-FE71DF195F4C}"/>
+          </a:p>
+        </p:txBody>
+      </p:sp>
+      <p:sp>
+        <p:nvSpPr>
+          <p:cNvPr id="138" name="Rectangle: Rounded Corners 137">
+            <a:extLst>
+              <a:ext uri="{FF2B5EF4-FFF2-40B4-BE49-F238E27FC236}">
+                <a16:creationId xmlns:a16="http://schemas.microsoft.com/office/drawing/2014/main" id="{A9502CBE-5601-C4F7-7BCA-B064F8C996C8}"/>
               </a:ext>
             </a:extLst>
           </p:cNvPr>
@@ -7801,10 +7465,10 @@
       </p:sp>
       <p:sp>
         <p:nvSpPr>
-          <p:cNvPr id="87" name="TextBox 86">
-            <a:extLst>
-              <a:ext uri="{FF2B5EF4-FFF2-40B4-BE49-F238E27FC236}">
-                <a16:creationId xmlns:a16="http://schemas.microsoft.com/office/drawing/2014/main" id="{125618B8-1F57-0ED0-3543-FDE537B5D876}"/>
+          <p:cNvPr id="139" name="TextBox 138">
+            <a:extLst>
+              <a:ext uri="{FF2B5EF4-FFF2-40B4-BE49-F238E27FC236}">
+                <a16:creationId xmlns:a16="http://schemas.microsoft.com/office/drawing/2014/main" id="{5263F916-DEF7-97C4-B0A8-15E73B0D7158}"/>
               </a:ext>
             </a:extLst>
           </p:cNvPr>
@@ -7837,10 +7501,10 @@
       </p:sp>
       <p:sp>
         <p:nvSpPr>
-          <p:cNvPr id="88" name="Rectangle: Rounded Corners 87">
-            <a:extLst>
-              <a:ext uri="{FF2B5EF4-FFF2-40B4-BE49-F238E27FC236}">
-                <a16:creationId xmlns:a16="http://schemas.microsoft.com/office/drawing/2014/main" id="{5408B452-E917-752B-9061-AD56F359C42E}"/>
+          <p:cNvPr id="140" name="Rectangle: Rounded Corners 139">
+            <a:extLst>
+              <a:ext uri="{FF2B5EF4-FFF2-40B4-BE49-F238E27FC236}">
+                <a16:creationId xmlns:a16="http://schemas.microsoft.com/office/drawing/2014/main" id="{9C0AA428-3948-B13A-4D08-0BF44589B256}"/>
               </a:ext>
             </a:extLst>
           </p:cNvPr>
@@ -7886,10 +7550,10 @@
       </p:sp>
       <p:cxnSp>
         <p:nvCxnSpPr>
-          <p:cNvPr id="89" name="Straight Arrow Connector 88">
-            <a:extLst>
-              <a:ext uri="{FF2B5EF4-FFF2-40B4-BE49-F238E27FC236}">
-                <a16:creationId xmlns:a16="http://schemas.microsoft.com/office/drawing/2014/main" id="{653088F4-DDF4-A222-17C8-C7EFC4BD911D}"/>
+          <p:cNvPr id="141" name="Straight Arrow Connector 140">
+            <a:extLst>
+              <a:ext uri="{FF2B5EF4-FFF2-40B4-BE49-F238E27FC236}">
+                <a16:creationId xmlns:a16="http://schemas.microsoft.com/office/drawing/2014/main" id="{6F66E6E2-F956-9694-2A71-EAEBA27EF9F6}"/>
               </a:ext>
             </a:extLst>
           </p:cNvPr>
@@ -7927,10 +7591,10 @@
       </p:cxnSp>
       <p:sp>
         <p:nvSpPr>
-          <p:cNvPr id="90" name="TextBox 89">
-            <a:extLst>
-              <a:ext uri="{FF2B5EF4-FFF2-40B4-BE49-F238E27FC236}">
-                <a16:creationId xmlns:a16="http://schemas.microsoft.com/office/drawing/2014/main" id="{43E06908-17A4-6761-E21A-848893E6353B}"/>
+          <p:cNvPr id="142" name="TextBox 141">
+            <a:extLst>
+              <a:ext uri="{FF2B5EF4-FFF2-40B4-BE49-F238E27FC236}">
+                <a16:creationId xmlns:a16="http://schemas.microsoft.com/office/drawing/2014/main" id="{582FE200-EF76-D837-DBD7-577C090A8A25}"/>
               </a:ext>
             </a:extLst>
           </p:cNvPr>
@@ -7955,10 +7619,2425 @@
           <a:p>
             <a:pPr algn="ctr"/>
             <a:r>
+              <a:rPr lang="en-US" dirty="0"/>
+              <a:t>Softmax</a:t>
+            </a:r>
+          </a:p>
+        </p:txBody>
+      </p:sp>
+      <p:cxnSp>
+        <p:nvCxnSpPr>
+          <p:cNvPr id="143" name="Straight Arrow Connector 142">
+            <a:extLst>
+              <a:ext uri="{FF2B5EF4-FFF2-40B4-BE49-F238E27FC236}">
+                <a16:creationId xmlns:a16="http://schemas.microsoft.com/office/drawing/2014/main" id="{36CA5C57-A9F3-70DF-69AE-FA9BF26E27D3}"/>
+              </a:ext>
+            </a:extLst>
+          </p:cNvPr>
+          <p:cNvCxnSpPr>
+            <a:cxnSpLocks/>
+          </p:cNvCxnSpPr>
+          <p:nvPr/>
+        </p:nvCxnSpPr>
+        <p:spPr>
+          <a:xfrm flipV="1">
+            <a:off x="6142236" y="565797"/>
+            <a:ext cx="1" cy="365760"/>
+          </a:xfrm>
+          <a:prstGeom prst="straightConnector1">
+            <a:avLst/>
+          </a:prstGeom>
+          <a:ln>
+            <a:tailEnd type="triangle"/>
+          </a:ln>
+        </p:spPr>
+        <p:style>
+          <a:lnRef idx="2">
+            <a:schemeClr val="dk1"/>
+          </a:lnRef>
+          <a:fillRef idx="0">
+            <a:schemeClr val="dk1"/>
+          </a:fillRef>
+          <a:effectRef idx="1">
+            <a:schemeClr val="dk1"/>
+          </a:effectRef>
+          <a:fontRef idx="minor">
+            <a:schemeClr val="tx1"/>
+          </a:fontRef>
+        </p:style>
+      </p:cxnSp>
+      <p:sp>
+        <p:nvSpPr>
+          <p:cNvPr id="144" name="TextBox 143">
+            <a:extLst>
+              <a:ext uri="{FF2B5EF4-FFF2-40B4-BE49-F238E27FC236}">
+                <a16:creationId xmlns:a16="http://schemas.microsoft.com/office/drawing/2014/main" id="{72E0632D-5386-51E6-9931-29D4A37F0C9A}"/>
+              </a:ext>
+            </a:extLst>
+          </p:cNvPr>
+          <p:cNvSpPr txBox="1"/>
+          <p:nvPr/>
+        </p:nvSpPr>
+        <p:spPr>
+          <a:xfrm>
+            <a:off x="5356115" y="176443"/>
+            <a:ext cx="1463040" cy="369332"/>
+          </a:xfrm>
+          <a:prstGeom prst="rect">
+            <a:avLst/>
+          </a:prstGeom>
+          <a:noFill/>
+        </p:spPr>
+        <p:txBody>
+          <a:bodyPr wrap="square" rtlCol="0">
+            <a:spAutoFit/>
+          </a:bodyPr>
+          <a:lstStyle/>
+          <a:p>
+            <a:pPr algn="ctr"/>
+            <a:r>
+              <a:rPr lang="en-US" dirty="0"/>
+              <a:t>Output</a:t>
+            </a:r>
+          </a:p>
+        </p:txBody>
+      </p:sp>
+      <p:sp>
+        <p:nvSpPr>
+          <p:cNvPr id="145" name="TextBox 144">
+            <a:extLst>
+              <a:ext uri="{FF2B5EF4-FFF2-40B4-BE49-F238E27FC236}">
+                <a16:creationId xmlns:a16="http://schemas.microsoft.com/office/drawing/2014/main" id="{82836BF6-C465-E7B1-A8C1-65BE0E44D7BC}"/>
+              </a:ext>
+            </a:extLst>
+          </p:cNvPr>
+          <p:cNvSpPr txBox="1"/>
+          <p:nvPr/>
+        </p:nvSpPr>
+        <p:spPr>
+          <a:xfrm>
+            <a:off x="1874276" y="645507"/>
+            <a:ext cx="2088261" cy="769441"/>
+          </a:xfrm>
+          <a:prstGeom prst="rect">
+            <a:avLst/>
+          </a:prstGeom>
+          <a:noFill/>
+        </p:spPr>
+        <p:txBody>
+          <a:bodyPr wrap="square" rtlCol="0">
+            <a:spAutoFit/>
+          </a:bodyPr>
+          <a:lstStyle/>
+          <a:p>
+            <a:r>
+              <a:rPr lang="en-US" sz="4400" dirty="0">
+                <a:latin typeface="+mj-lt"/>
+              </a:rPr>
+              <a:t>Hybrid 2</a:t>
+            </a:r>
+          </a:p>
+        </p:txBody>
+      </p:sp>
+    </p:spTree>
+    <p:extLst>
+      <p:ext uri="{BB962C8B-B14F-4D97-AF65-F5344CB8AC3E}">
+        <p14:creationId xmlns:p14="http://schemas.microsoft.com/office/powerpoint/2010/main" val="2388354170"/>
+      </p:ext>
+    </p:extLst>
+  </p:cSld>
+  <p:clrMapOvr>
+    <a:masterClrMapping/>
+  </p:clrMapOvr>
+</p:sld>
+</file>
+
+<file path=ppt/slides/slide4.xml><?xml version="1.0" encoding="utf-8"?>
+<p:sld xmlns:a="http://schemas.openxmlformats.org/drawingml/2006/main" xmlns:r="http://schemas.openxmlformats.org/officeDocument/2006/relationships" xmlns:p="http://schemas.openxmlformats.org/presentationml/2006/main">
+  <p:cSld>
+    <p:spTree>
+      <p:nvGrpSpPr>
+        <p:cNvPr id="1" name=""/>
+        <p:cNvGrpSpPr/>
+        <p:nvPr/>
+      </p:nvGrpSpPr>
+      <p:grpSpPr>
+        <a:xfrm>
+          <a:off x="0" y="0"/>
+          <a:ext cx="0" cy="0"/>
+          <a:chOff x="0" y="0"/>
+          <a:chExt cx="0" cy="0"/>
+        </a:xfrm>
+      </p:grpSpPr>
+      <p:sp>
+        <p:nvSpPr>
+          <p:cNvPr id="2" name="Title 1">
+            <a:extLst>
+              <a:ext uri="{FF2B5EF4-FFF2-40B4-BE49-F238E27FC236}">
+                <a16:creationId xmlns:a16="http://schemas.microsoft.com/office/drawing/2014/main" id="{C0B4B7DA-9E84-57F3-A20E-B97BAEA531A1}"/>
+              </a:ext>
+            </a:extLst>
+          </p:cNvPr>
+          <p:cNvSpPr>
+            <a:spLocks noGrp="1"/>
+          </p:cNvSpPr>
+          <p:nvPr>
+            <p:ph type="title"/>
+          </p:nvPr>
+        </p:nvSpPr>
+        <p:spPr/>
+        <p:txBody>
+          <a:bodyPr/>
+          <a:lstStyle/>
+          <a:p>
+            <a:r>
+              <a:rPr lang="en-US" dirty="0"/>
+              <a:t>Gated Linear Units</a:t>
+            </a:r>
+          </a:p>
+        </p:txBody>
+      </p:sp>
+      <p:sp>
+        <p:nvSpPr>
+          <p:cNvPr id="3" name="Content Placeholder 2">
+            <a:extLst>
+              <a:ext uri="{FF2B5EF4-FFF2-40B4-BE49-F238E27FC236}">
+                <a16:creationId xmlns:a16="http://schemas.microsoft.com/office/drawing/2014/main" id="{2E437F91-8A21-BED3-D4DB-CAA902D2C6E6}"/>
+              </a:ext>
+            </a:extLst>
+          </p:cNvPr>
+          <p:cNvSpPr>
+            <a:spLocks noGrp="1"/>
+          </p:cNvSpPr>
+          <p:nvPr>
+            <p:ph idx="1"/>
+          </p:nvPr>
+        </p:nvSpPr>
+        <p:spPr/>
+        <p:txBody>
+          <a:bodyPr/>
+          <a:lstStyle/>
+          <a:p>
+            <a:endParaRPr lang="en-US"/>
+          </a:p>
+        </p:txBody>
+      </p:sp>
+    </p:spTree>
+    <p:extLst>
+      <p:ext uri="{BB962C8B-B14F-4D97-AF65-F5344CB8AC3E}">
+        <p14:creationId xmlns:p14="http://schemas.microsoft.com/office/powerpoint/2010/main" val="1182844693"/>
+      </p:ext>
+    </p:extLst>
+  </p:cSld>
+  <p:clrMapOvr>
+    <a:masterClrMapping/>
+  </p:clrMapOvr>
+</p:sld>
+</file>
+
+<file path=ppt/slides/slide5.xml><?xml version="1.0" encoding="utf-8"?>
+<p:sld xmlns:a="http://schemas.openxmlformats.org/drawingml/2006/main" xmlns:r="http://schemas.openxmlformats.org/officeDocument/2006/relationships" xmlns:p="http://schemas.openxmlformats.org/presentationml/2006/main">
+  <p:cSld>
+    <p:spTree>
+      <p:nvGrpSpPr>
+        <p:cNvPr id="1" name=""/>
+        <p:cNvGrpSpPr/>
+        <p:nvPr/>
+      </p:nvGrpSpPr>
+      <p:grpSpPr>
+        <a:xfrm>
+          <a:off x="0" y="0"/>
+          <a:ext cx="0" cy="0"/>
+          <a:chOff x="0" y="0"/>
+          <a:chExt cx="0" cy="0"/>
+        </a:xfrm>
+      </p:grpSpPr>
+      <p:sp>
+        <p:nvSpPr>
+          <p:cNvPr id="2" name="Title 1">
+            <a:extLst>
+              <a:ext uri="{FF2B5EF4-FFF2-40B4-BE49-F238E27FC236}">
+                <a16:creationId xmlns:a16="http://schemas.microsoft.com/office/drawing/2014/main" id="{0ACB5061-E020-63A8-F29D-9B8414E7F4DF}"/>
+              </a:ext>
+            </a:extLst>
+          </p:cNvPr>
+          <p:cNvSpPr>
+            <a:spLocks noGrp="1"/>
+          </p:cNvSpPr>
+          <p:nvPr>
+            <p:ph type="title"/>
+          </p:nvPr>
+        </p:nvSpPr>
+        <p:spPr/>
+        <p:txBody>
+          <a:bodyPr/>
+          <a:lstStyle/>
+          <a:p>
+            <a:r>
+              <a:rPr lang="en-US" dirty="0"/>
+              <a:t>Expanded Activation</a:t>
+            </a:r>
+          </a:p>
+        </p:txBody>
+      </p:sp>
+      <p:sp>
+        <p:nvSpPr>
+          <p:cNvPr id="3" name="Content Placeholder 2">
+            <a:extLst>
+              <a:ext uri="{FF2B5EF4-FFF2-40B4-BE49-F238E27FC236}">
+                <a16:creationId xmlns:a16="http://schemas.microsoft.com/office/drawing/2014/main" id="{0A34F9FC-C186-432D-A309-5AE1180242F7}"/>
+              </a:ext>
+            </a:extLst>
+          </p:cNvPr>
+          <p:cNvSpPr>
+            <a:spLocks noGrp="1"/>
+          </p:cNvSpPr>
+          <p:nvPr>
+            <p:ph idx="1"/>
+          </p:nvPr>
+        </p:nvSpPr>
+        <p:spPr/>
+        <p:txBody>
+          <a:bodyPr/>
+          <a:lstStyle/>
+          <a:p>
+            <a:endParaRPr lang="en-US"/>
+          </a:p>
+        </p:txBody>
+      </p:sp>
+    </p:spTree>
+    <p:extLst>
+      <p:ext uri="{BB962C8B-B14F-4D97-AF65-F5344CB8AC3E}">
+        <p14:creationId xmlns:p14="http://schemas.microsoft.com/office/powerpoint/2010/main" val="4054262739"/>
+      </p:ext>
+    </p:extLst>
+  </p:cSld>
+  <p:clrMapOvr>
+    <a:masterClrMapping/>
+  </p:clrMapOvr>
+</p:sld>
+</file>
+
+<file path=ppt/slides/slide6.xml><?xml version="1.0" encoding="utf-8"?>
+<p:sld xmlns:a="http://schemas.openxmlformats.org/drawingml/2006/main" xmlns:r="http://schemas.openxmlformats.org/officeDocument/2006/relationships" xmlns:p="http://schemas.openxmlformats.org/presentationml/2006/main">
+  <p:cSld>
+    <p:spTree>
+      <p:nvGrpSpPr>
+        <p:cNvPr id="1" name=""/>
+        <p:cNvGrpSpPr/>
+        <p:nvPr/>
+      </p:nvGrpSpPr>
+      <p:grpSpPr>
+        <a:xfrm>
+          <a:off x="0" y="0"/>
+          <a:ext cx="0" cy="0"/>
+          <a:chOff x="0" y="0"/>
+          <a:chExt cx="0" cy="0"/>
+        </a:xfrm>
+      </p:grpSpPr>
+      <p:sp>
+        <p:nvSpPr>
+          <p:cNvPr id="2" name="Title 1">
+            <a:extLst>
+              <a:ext uri="{FF2B5EF4-FFF2-40B4-BE49-F238E27FC236}">
+                <a16:creationId xmlns:a16="http://schemas.microsoft.com/office/drawing/2014/main" id="{205C2350-3AD0-E288-926F-DE2A5498CCE4}"/>
+              </a:ext>
+            </a:extLst>
+          </p:cNvPr>
+          <p:cNvSpPr>
+            <a:spLocks noGrp="1"/>
+          </p:cNvSpPr>
+          <p:nvPr>
+            <p:ph type="title"/>
+          </p:nvPr>
+        </p:nvSpPr>
+        <p:spPr/>
+        <p:txBody>
+          <a:bodyPr/>
+          <a:lstStyle/>
+          <a:p>
+            <a:r>
               <a:rPr lang="en-US" dirty="0" err="1"/>
+              <a:t>ReZero</a:t>
+            </a:r>
+            <a:endParaRPr lang="en-US" dirty="0"/>
+          </a:p>
+        </p:txBody>
+      </p:sp>
+    </p:spTree>
+    <p:extLst>
+      <p:ext uri="{BB962C8B-B14F-4D97-AF65-F5344CB8AC3E}">
+        <p14:creationId xmlns:p14="http://schemas.microsoft.com/office/powerpoint/2010/main" val="4043992591"/>
+      </p:ext>
+    </p:extLst>
+  </p:cSld>
+  <p:clrMapOvr>
+    <a:masterClrMapping/>
+  </p:clrMapOvr>
+</p:sld>
+</file>
+
+<file path=ppt/slides/slide7.xml><?xml version="1.0" encoding="utf-8"?>
+<p:sld xmlns:a="http://schemas.openxmlformats.org/drawingml/2006/main" xmlns:r="http://schemas.openxmlformats.org/officeDocument/2006/relationships" xmlns:p="http://schemas.openxmlformats.org/presentationml/2006/main">
+  <p:cSld>
+    <p:spTree>
+      <p:nvGrpSpPr>
+        <p:cNvPr id="1" name=""/>
+        <p:cNvGrpSpPr/>
+        <p:nvPr/>
+      </p:nvGrpSpPr>
+      <p:grpSpPr>
+        <a:xfrm>
+          <a:off x="0" y="0"/>
+          <a:ext cx="0" cy="0"/>
+          <a:chOff x="0" y="0"/>
+          <a:chExt cx="0" cy="0"/>
+        </a:xfrm>
+      </p:grpSpPr>
+      <p:sp>
+        <p:nvSpPr>
+          <p:cNvPr id="2" name="Title 1">
+            <a:extLst>
+              <a:ext uri="{FF2B5EF4-FFF2-40B4-BE49-F238E27FC236}">
+                <a16:creationId xmlns:a16="http://schemas.microsoft.com/office/drawing/2014/main" id="{8F851273-9B86-9301-8CAD-B1EE8479F718}"/>
+              </a:ext>
+            </a:extLst>
+          </p:cNvPr>
+          <p:cNvSpPr>
+            <a:spLocks noGrp="1"/>
+          </p:cNvSpPr>
+          <p:nvPr>
+            <p:ph type="title"/>
+          </p:nvPr>
+        </p:nvSpPr>
+        <p:spPr/>
+        <p:txBody>
+          <a:bodyPr/>
+          <a:lstStyle/>
+          <a:p>
+            <a:r>
+              <a:rPr lang="en-US" dirty="0"/>
+              <a:t>Rotary</a:t>
+            </a:r>
+          </a:p>
+        </p:txBody>
+      </p:sp>
+      <p:sp>
+        <p:nvSpPr>
+          <p:cNvPr id="47" name="Rectangle: Rounded Corners 46">
+            <a:extLst>
+              <a:ext uri="{FF2B5EF4-FFF2-40B4-BE49-F238E27FC236}">
+                <a16:creationId xmlns:a16="http://schemas.microsoft.com/office/drawing/2014/main" id="{91C19C99-DCFA-E7F2-08F3-7F948221D47D}"/>
+              </a:ext>
+            </a:extLst>
+          </p:cNvPr>
+          <p:cNvSpPr/>
+          <p:nvPr/>
+        </p:nvSpPr>
+        <p:spPr>
+          <a:xfrm>
+            <a:off x="4740809" y="2396647"/>
+            <a:ext cx="2816351" cy="3566160"/>
+          </a:xfrm>
+          <a:prstGeom prst="roundRect">
+            <a:avLst/>
+          </a:prstGeom>
+          <a:noFill/>
+        </p:spPr>
+        <p:style>
+          <a:lnRef idx="2">
+            <a:schemeClr val="accent1">
+              <a:shade val="15000"/>
+            </a:schemeClr>
+          </a:lnRef>
+          <a:fillRef idx="1">
+            <a:schemeClr val="accent1"/>
+          </a:fillRef>
+          <a:effectRef idx="0">
+            <a:schemeClr val="accent1"/>
+          </a:effectRef>
+          <a:fontRef idx="minor">
+            <a:schemeClr val="lt1"/>
+          </a:fontRef>
+        </p:style>
+        <p:txBody>
+          <a:bodyPr rtlCol="0" anchor="ctr"/>
+          <a:lstStyle/>
+          <a:p>
+            <a:pPr algn="ctr"/>
+            <a:endParaRPr lang="en-US"/>
+          </a:p>
+        </p:txBody>
+      </p:sp>
+      <p:sp>
+        <p:nvSpPr>
+          <p:cNvPr id="48" name="Rectangle: Rounded Corners 47">
+            <a:extLst>
+              <a:ext uri="{FF2B5EF4-FFF2-40B4-BE49-F238E27FC236}">
+                <a16:creationId xmlns:a16="http://schemas.microsoft.com/office/drawing/2014/main" id="{878B0FA6-C9DD-F7A1-AD94-3A8F96B10EA9}"/>
+              </a:ext>
+            </a:extLst>
+          </p:cNvPr>
+          <p:cNvSpPr/>
+          <p:nvPr/>
+        </p:nvSpPr>
+        <p:spPr>
+          <a:xfrm>
+            <a:off x="5106367" y="6080803"/>
+            <a:ext cx="2088261" cy="476644"/>
+          </a:xfrm>
+          <a:prstGeom prst="roundRect">
+            <a:avLst/>
+          </a:prstGeom>
+          <a:solidFill>
+            <a:schemeClr val="accent5">
+              <a:lumMod val="20000"/>
+              <a:lumOff val="80000"/>
+            </a:schemeClr>
+          </a:solidFill>
+          <a:ln>
+            <a:solidFill>
+              <a:schemeClr val="tx1"/>
+            </a:solidFill>
+          </a:ln>
+        </p:spPr>
+        <p:style>
+          <a:lnRef idx="2">
+            <a:schemeClr val="accent1">
+              <a:shade val="15000"/>
+            </a:schemeClr>
+          </a:lnRef>
+          <a:fillRef idx="1">
+            <a:schemeClr val="accent1"/>
+          </a:fillRef>
+          <a:effectRef idx="0">
+            <a:schemeClr val="accent1"/>
+          </a:effectRef>
+          <a:fontRef idx="minor">
+            <a:schemeClr val="lt1"/>
+          </a:fontRef>
+        </p:style>
+        <p:txBody>
+          <a:bodyPr rtlCol="0" anchor="ctr"/>
+          <a:lstStyle/>
+          <a:p>
+            <a:pPr algn="ctr"/>
+            <a:endParaRPr lang="en-US"/>
+          </a:p>
+        </p:txBody>
+      </p:sp>
+      <p:sp>
+        <p:nvSpPr>
+          <p:cNvPr id="49" name="TextBox 48">
+            <a:extLst>
+              <a:ext uri="{FF2B5EF4-FFF2-40B4-BE49-F238E27FC236}">
+                <a16:creationId xmlns:a16="http://schemas.microsoft.com/office/drawing/2014/main" id="{3EA5B913-D08B-46EE-0D0A-87C59115D379}"/>
+              </a:ext>
+            </a:extLst>
+          </p:cNvPr>
+          <p:cNvSpPr txBox="1"/>
+          <p:nvPr/>
+        </p:nvSpPr>
+        <p:spPr>
+          <a:xfrm>
+            <a:off x="5418976" y="6134459"/>
+            <a:ext cx="1463040" cy="369332"/>
+          </a:xfrm>
+          <a:prstGeom prst="rect">
+            <a:avLst/>
+          </a:prstGeom>
+          <a:noFill/>
+        </p:spPr>
+        <p:txBody>
+          <a:bodyPr wrap="square" rtlCol="0">
+            <a:spAutoFit/>
+          </a:bodyPr>
+          <a:lstStyle/>
+          <a:p>
+            <a:pPr algn="ctr"/>
+            <a:r>
+              <a:rPr lang="en-US" dirty="0"/>
+              <a:t>Embeddings</a:t>
+            </a:r>
+          </a:p>
+        </p:txBody>
+      </p:sp>
+      <p:sp>
+        <p:nvSpPr>
+          <p:cNvPr id="50" name="Rectangle: Rounded Corners 49">
+            <a:extLst>
+              <a:ext uri="{FF2B5EF4-FFF2-40B4-BE49-F238E27FC236}">
+                <a16:creationId xmlns:a16="http://schemas.microsoft.com/office/drawing/2014/main" id="{5368B065-B206-6653-9EDC-442EF4EABF15}"/>
+              </a:ext>
+            </a:extLst>
+          </p:cNvPr>
+          <p:cNvSpPr/>
+          <p:nvPr/>
+        </p:nvSpPr>
+        <p:spPr>
+          <a:xfrm>
+            <a:off x="5101805" y="5217389"/>
+            <a:ext cx="2088261" cy="476644"/>
+          </a:xfrm>
+          <a:prstGeom prst="roundRect">
+            <a:avLst/>
+          </a:prstGeom>
+          <a:solidFill>
+            <a:schemeClr val="accent2">
+              <a:lumMod val="40000"/>
+              <a:lumOff val="60000"/>
+            </a:schemeClr>
+          </a:solidFill>
+        </p:spPr>
+        <p:style>
+          <a:lnRef idx="2">
+            <a:schemeClr val="accent1">
+              <a:shade val="15000"/>
+            </a:schemeClr>
+          </a:lnRef>
+          <a:fillRef idx="1">
+            <a:schemeClr val="accent1"/>
+          </a:fillRef>
+          <a:effectRef idx="0">
+            <a:schemeClr val="accent1"/>
+          </a:effectRef>
+          <a:fontRef idx="minor">
+            <a:schemeClr val="lt1"/>
+          </a:fontRef>
+        </p:style>
+        <p:txBody>
+          <a:bodyPr rtlCol="0" anchor="ctr"/>
+          <a:lstStyle/>
+          <a:p>
+            <a:pPr algn="ctr"/>
+            <a:endParaRPr lang="en-US"/>
+          </a:p>
+        </p:txBody>
+      </p:sp>
+      <p:sp>
+        <p:nvSpPr>
+          <p:cNvPr id="51" name="TextBox 50">
+            <a:extLst>
+              <a:ext uri="{FF2B5EF4-FFF2-40B4-BE49-F238E27FC236}">
+                <a16:creationId xmlns:a16="http://schemas.microsoft.com/office/drawing/2014/main" id="{9C6BA9CC-A48E-8F1A-96D6-FBC138F42242}"/>
+              </a:ext>
+            </a:extLst>
+          </p:cNvPr>
+          <p:cNvSpPr txBox="1"/>
+          <p:nvPr/>
+        </p:nvSpPr>
+        <p:spPr>
+          <a:xfrm>
+            <a:off x="5414416" y="5271045"/>
+            <a:ext cx="1463040" cy="369332"/>
+          </a:xfrm>
+          <a:prstGeom prst="rect">
+            <a:avLst/>
+          </a:prstGeom>
+          <a:noFill/>
+        </p:spPr>
+        <p:txBody>
+          <a:bodyPr wrap="square" rtlCol="0">
+            <a:spAutoFit/>
+          </a:bodyPr>
+          <a:lstStyle/>
+          <a:p>
+            <a:pPr algn="ctr"/>
+            <a:r>
+              <a:rPr lang="en-US" dirty="0"/>
+              <a:t>RMS Norm</a:t>
+            </a:r>
+          </a:p>
+        </p:txBody>
+      </p:sp>
+      <p:cxnSp>
+        <p:nvCxnSpPr>
+          <p:cNvPr id="52" name="Straight Arrow Connector 51">
+            <a:extLst>
+              <a:ext uri="{FF2B5EF4-FFF2-40B4-BE49-F238E27FC236}">
+                <a16:creationId xmlns:a16="http://schemas.microsoft.com/office/drawing/2014/main" id="{4ACF1389-EC33-C5BF-1DE1-95820FA505C5}"/>
+              </a:ext>
+            </a:extLst>
+          </p:cNvPr>
+          <p:cNvCxnSpPr>
+            <a:cxnSpLocks/>
+            <a:stCxn id="48" idx="0"/>
+            <a:endCxn id="50" idx="2"/>
+          </p:cNvCxnSpPr>
+          <p:nvPr/>
+        </p:nvCxnSpPr>
+        <p:spPr>
+          <a:xfrm flipH="1" flipV="1">
+            <a:off x="6145936" y="5694033"/>
+            <a:ext cx="4562" cy="386770"/>
+          </a:xfrm>
+          <a:prstGeom prst="straightConnector1">
+            <a:avLst/>
+          </a:prstGeom>
+          <a:ln>
+            <a:solidFill>
+              <a:schemeClr val="tx1"/>
+            </a:solidFill>
+            <a:tailEnd type="triangle"/>
+          </a:ln>
+        </p:spPr>
+        <p:style>
+          <a:lnRef idx="2">
+            <a:schemeClr val="accent1"/>
+          </a:lnRef>
+          <a:fillRef idx="0">
+            <a:schemeClr val="accent1"/>
+          </a:fillRef>
+          <a:effectRef idx="1">
+            <a:schemeClr val="accent1"/>
+          </a:effectRef>
+          <a:fontRef idx="minor">
+            <a:schemeClr val="tx1"/>
+          </a:fontRef>
+        </p:style>
+      </p:cxnSp>
+      <p:sp>
+        <p:nvSpPr>
+          <p:cNvPr id="53" name="Rectangle: Rounded Corners 52">
+            <a:extLst>
+              <a:ext uri="{FF2B5EF4-FFF2-40B4-BE49-F238E27FC236}">
+                <a16:creationId xmlns:a16="http://schemas.microsoft.com/office/drawing/2014/main" id="{115F6149-1797-5220-5657-56DB6F555692}"/>
+              </a:ext>
+            </a:extLst>
+          </p:cNvPr>
+          <p:cNvSpPr/>
+          <p:nvPr/>
+        </p:nvSpPr>
+        <p:spPr>
+          <a:xfrm>
+            <a:off x="5101803" y="4349315"/>
+            <a:ext cx="2088261" cy="476644"/>
+          </a:xfrm>
+          <a:prstGeom prst="roundRect">
+            <a:avLst/>
+          </a:prstGeom>
+          <a:solidFill>
+            <a:srgbClr val="FFE2BB"/>
+          </a:solidFill>
+        </p:spPr>
+        <p:style>
+          <a:lnRef idx="2">
+            <a:schemeClr val="accent1">
+              <a:shade val="15000"/>
+            </a:schemeClr>
+          </a:lnRef>
+          <a:fillRef idx="1">
+            <a:schemeClr val="accent1"/>
+          </a:fillRef>
+          <a:effectRef idx="0">
+            <a:schemeClr val="accent1"/>
+          </a:effectRef>
+          <a:fontRef idx="minor">
+            <a:schemeClr val="lt1"/>
+          </a:fontRef>
+        </p:style>
+        <p:txBody>
+          <a:bodyPr rtlCol="0" anchor="ctr"/>
+          <a:lstStyle/>
+          <a:p>
+            <a:pPr algn="ctr"/>
+            <a:endParaRPr lang="en-US"/>
+          </a:p>
+        </p:txBody>
+      </p:sp>
+      <p:sp>
+        <p:nvSpPr>
+          <p:cNvPr id="54" name="TextBox 53">
+            <a:extLst>
+              <a:ext uri="{FF2B5EF4-FFF2-40B4-BE49-F238E27FC236}">
+                <a16:creationId xmlns:a16="http://schemas.microsoft.com/office/drawing/2014/main" id="{22A8FBB3-80BB-0877-70F7-762F4EC98E9D}"/>
+              </a:ext>
+            </a:extLst>
+          </p:cNvPr>
+          <p:cNvSpPr txBox="1"/>
+          <p:nvPr/>
+        </p:nvSpPr>
+        <p:spPr>
+          <a:xfrm>
+            <a:off x="5043505" y="4395695"/>
+            <a:ext cx="2190185" cy="369332"/>
+          </a:xfrm>
+          <a:prstGeom prst="rect">
+            <a:avLst/>
+          </a:prstGeom>
+          <a:noFill/>
+        </p:spPr>
+        <p:txBody>
+          <a:bodyPr wrap="square" rtlCol="0">
+            <a:spAutoFit/>
+          </a:bodyPr>
+          <a:lstStyle/>
+          <a:p>
+            <a:pPr algn="ctr"/>
+            <a:r>
+              <a:rPr lang="en-US" dirty="0"/>
+              <a:t>Self Attention</a:t>
+            </a:r>
+          </a:p>
+        </p:txBody>
+      </p:sp>
+      <p:cxnSp>
+        <p:nvCxnSpPr>
+          <p:cNvPr id="55" name="Straight Connector 54">
+            <a:extLst>
+              <a:ext uri="{FF2B5EF4-FFF2-40B4-BE49-F238E27FC236}">
+                <a16:creationId xmlns:a16="http://schemas.microsoft.com/office/drawing/2014/main" id="{CE57B08F-9FA5-1C40-5175-40E54E07BC70}"/>
+              </a:ext>
+            </a:extLst>
+          </p:cNvPr>
+          <p:cNvCxnSpPr>
+            <a:stCxn id="50" idx="0"/>
+          </p:cNvCxnSpPr>
+          <p:nvPr/>
+        </p:nvCxnSpPr>
+        <p:spPr>
+          <a:xfrm flipH="1" flipV="1">
+            <a:off x="6145934" y="5094127"/>
+            <a:ext cx="2" cy="123262"/>
+          </a:xfrm>
+          <a:prstGeom prst="line">
+            <a:avLst/>
+          </a:prstGeom>
+        </p:spPr>
+        <p:style>
+          <a:lnRef idx="2">
+            <a:schemeClr val="dk1"/>
+          </a:lnRef>
+          <a:fillRef idx="0">
+            <a:schemeClr val="dk1"/>
+          </a:fillRef>
+          <a:effectRef idx="1">
+            <a:schemeClr val="dk1"/>
+          </a:effectRef>
+          <a:fontRef idx="minor">
+            <a:schemeClr val="tx1"/>
+          </a:fontRef>
+        </p:style>
+      </p:cxnSp>
+      <p:cxnSp>
+        <p:nvCxnSpPr>
+          <p:cNvPr id="56" name="Straight Connector 55">
+            <a:extLst>
+              <a:ext uri="{FF2B5EF4-FFF2-40B4-BE49-F238E27FC236}">
+                <a16:creationId xmlns:a16="http://schemas.microsoft.com/office/drawing/2014/main" id="{7A827B07-B5B4-BFD2-3C21-05F73FEEAE19}"/>
+              </a:ext>
+            </a:extLst>
+          </p:cNvPr>
+          <p:cNvCxnSpPr>
+            <a:cxnSpLocks/>
+          </p:cNvCxnSpPr>
+          <p:nvPr/>
+        </p:nvCxnSpPr>
+        <p:spPr>
+          <a:xfrm>
+            <a:off x="5269634" y="5094127"/>
+            <a:ext cx="1752600" cy="0"/>
+          </a:xfrm>
+          <a:prstGeom prst="line">
+            <a:avLst/>
+          </a:prstGeom>
+        </p:spPr>
+        <p:style>
+          <a:lnRef idx="2">
+            <a:schemeClr val="dk1"/>
+          </a:lnRef>
+          <a:fillRef idx="0">
+            <a:schemeClr val="dk1"/>
+          </a:fillRef>
+          <a:effectRef idx="1">
+            <a:schemeClr val="dk1"/>
+          </a:effectRef>
+          <a:fontRef idx="minor">
+            <a:schemeClr val="tx1"/>
+          </a:fontRef>
+        </p:style>
+      </p:cxnSp>
+      <p:cxnSp>
+        <p:nvCxnSpPr>
+          <p:cNvPr id="57" name="Straight Arrow Connector 56">
+            <a:extLst>
+              <a:ext uri="{FF2B5EF4-FFF2-40B4-BE49-F238E27FC236}">
+                <a16:creationId xmlns:a16="http://schemas.microsoft.com/office/drawing/2014/main" id="{A0118B78-F0E7-C6F9-FEF8-16A3C220F850}"/>
+              </a:ext>
+            </a:extLst>
+          </p:cNvPr>
+          <p:cNvCxnSpPr>
+            <a:cxnSpLocks/>
+          </p:cNvCxnSpPr>
+          <p:nvPr/>
+        </p:nvCxnSpPr>
+        <p:spPr>
+          <a:xfrm flipV="1">
+            <a:off x="7022229" y="4851207"/>
+            <a:ext cx="0" cy="242919"/>
+          </a:xfrm>
+          <a:prstGeom prst="straightConnector1">
+            <a:avLst/>
+          </a:prstGeom>
+          <a:ln>
+            <a:solidFill>
+              <a:schemeClr val="tx1"/>
+            </a:solidFill>
+            <a:tailEnd type="triangle"/>
+          </a:ln>
+        </p:spPr>
+        <p:style>
+          <a:lnRef idx="2">
+            <a:schemeClr val="accent1"/>
+          </a:lnRef>
+          <a:fillRef idx="0">
+            <a:schemeClr val="accent1"/>
+          </a:fillRef>
+          <a:effectRef idx="1">
+            <a:schemeClr val="accent1"/>
+          </a:effectRef>
+          <a:fontRef idx="minor">
+            <a:schemeClr val="tx1"/>
+          </a:fontRef>
+        </p:style>
+      </p:cxnSp>
+      <p:cxnSp>
+        <p:nvCxnSpPr>
+          <p:cNvPr id="58" name="Straight Arrow Connector 57">
+            <a:extLst>
+              <a:ext uri="{FF2B5EF4-FFF2-40B4-BE49-F238E27FC236}">
+                <a16:creationId xmlns:a16="http://schemas.microsoft.com/office/drawing/2014/main" id="{57037AC7-E00E-21B0-4D68-5178F1003906}"/>
+              </a:ext>
+            </a:extLst>
+          </p:cNvPr>
+          <p:cNvCxnSpPr>
+            <a:cxnSpLocks/>
+          </p:cNvCxnSpPr>
+          <p:nvPr/>
+        </p:nvCxnSpPr>
+        <p:spPr>
+          <a:xfrm flipV="1">
+            <a:off x="6145934" y="4851207"/>
+            <a:ext cx="0" cy="242919"/>
+          </a:xfrm>
+          <a:prstGeom prst="straightConnector1">
+            <a:avLst/>
+          </a:prstGeom>
+          <a:ln>
+            <a:solidFill>
+              <a:schemeClr val="tx1"/>
+            </a:solidFill>
+            <a:tailEnd type="triangle"/>
+          </a:ln>
+        </p:spPr>
+        <p:style>
+          <a:lnRef idx="2">
+            <a:schemeClr val="accent1"/>
+          </a:lnRef>
+          <a:fillRef idx="0">
+            <a:schemeClr val="accent1"/>
+          </a:fillRef>
+          <a:effectRef idx="1">
+            <a:schemeClr val="accent1"/>
+          </a:effectRef>
+          <a:fontRef idx="minor">
+            <a:schemeClr val="tx1"/>
+          </a:fontRef>
+        </p:style>
+      </p:cxnSp>
+      <p:cxnSp>
+        <p:nvCxnSpPr>
+          <p:cNvPr id="59" name="Straight Arrow Connector 58">
+            <a:extLst>
+              <a:ext uri="{FF2B5EF4-FFF2-40B4-BE49-F238E27FC236}">
+                <a16:creationId xmlns:a16="http://schemas.microsoft.com/office/drawing/2014/main" id="{068B435F-774A-37A9-5A3C-F232FFBB7213}"/>
+              </a:ext>
+            </a:extLst>
+          </p:cNvPr>
+          <p:cNvCxnSpPr>
+            <a:cxnSpLocks/>
+          </p:cNvCxnSpPr>
+          <p:nvPr/>
+        </p:nvCxnSpPr>
+        <p:spPr>
+          <a:xfrm flipV="1">
+            <a:off x="5269634" y="4854715"/>
+            <a:ext cx="0" cy="242919"/>
+          </a:xfrm>
+          <a:prstGeom prst="straightConnector1">
+            <a:avLst/>
+          </a:prstGeom>
+          <a:ln>
+            <a:solidFill>
+              <a:schemeClr val="tx1"/>
+            </a:solidFill>
+            <a:tailEnd type="triangle"/>
+          </a:ln>
+        </p:spPr>
+        <p:style>
+          <a:lnRef idx="2">
+            <a:schemeClr val="accent1"/>
+          </a:lnRef>
+          <a:fillRef idx="0">
+            <a:schemeClr val="accent1"/>
+          </a:fillRef>
+          <a:effectRef idx="1">
+            <a:schemeClr val="accent1"/>
+          </a:effectRef>
+          <a:fontRef idx="minor">
+            <a:schemeClr val="tx1"/>
+          </a:fontRef>
+        </p:style>
+      </p:cxnSp>
+      <p:sp>
+        <p:nvSpPr>
+          <p:cNvPr id="60" name="Rectangle: Rounded Corners 59">
+            <a:extLst>
+              <a:ext uri="{FF2B5EF4-FFF2-40B4-BE49-F238E27FC236}">
+                <a16:creationId xmlns:a16="http://schemas.microsoft.com/office/drawing/2014/main" id="{1664AE7E-9D2B-544D-B2FE-506DE454A27D}"/>
+              </a:ext>
+            </a:extLst>
+          </p:cNvPr>
+          <p:cNvSpPr/>
+          <p:nvPr/>
+        </p:nvSpPr>
+        <p:spPr>
+          <a:xfrm>
+            <a:off x="5101804" y="3478748"/>
+            <a:ext cx="2088261" cy="476644"/>
+          </a:xfrm>
+          <a:prstGeom prst="roundRect">
+            <a:avLst/>
+          </a:prstGeom>
+          <a:solidFill>
+            <a:schemeClr val="accent2">
+              <a:lumMod val="40000"/>
+              <a:lumOff val="60000"/>
+            </a:schemeClr>
+          </a:solidFill>
+        </p:spPr>
+        <p:style>
+          <a:lnRef idx="2">
+            <a:schemeClr val="accent1">
+              <a:shade val="15000"/>
+            </a:schemeClr>
+          </a:lnRef>
+          <a:fillRef idx="1">
+            <a:schemeClr val="accent1"/>
+          </a:fillRef>
+          <a:effectRef idx="0">
+            <a:schemeClr val="accent1"/>
+          </a:effectRef>
+          <a:fontRef idx="minor">
+            <a:schemeClr val="lt1"/>
+          </a:fontRef>
+        </p:style>
+        <p:txBody>
+          <a:bodyPr rtlCol="0" anchor="ctr"/>
+          <a:lstStyle/>
+          <a:p>
+            <a:pPr algn="ctr"/>
+            <a:endParaRPr lang="en-US"/>
+          </a:p>
+        </p:txBody>
+      </p:sp>
+      <p:sp>
+        <p:nvSpPr>
+          <p:cNvPr id="61" name="TextBox 60">
+            <a:extLst>
+              <a:ext uri="{FF2B5EF4-FFF2-40B4-BE49-F238E27FC236}">
+                <a16:creationId xmlns:a16="http://schemas.microsoft.com/office/drawing/2014/main" id="{E5C40924-631D-4770-8913-0638142CE64E}"/>
+              </a:ext>
+            </a:extLst>
+          </p:cNvPr>
+          <p:cNvSpPr txBox="1"/>
+          <p:nvPr/>
+        </p:nvSpPr>
+        <p:spPr>
+          <a:xfrm>
+            <a:off x="5414414" y="3532404"/>
+            <a:ext cx="1463040" cy="369332"/>
+          </a:xfrm>
+          <a:prstGeom prst="rect">
+            <a:avLst/>
+          </a:prstGeom>
+          <a:noFill/>
+        </p:spPr>
+        <p:txBody>
+          <a:bodyPr wrap="square" rtlCol="0">
+            <a:spAutoFit/>
+          </a:bodyPr>
+          <a:lstStyle/>
+          <a:p>
+            <a:pPr algn="ctr"/>
+            <a:r>
+              <a:rPr lang="en-US" dirty="0"/>
+              <a:t>RMS Norm</a:t>
+            </a:r>
+          </a:p>
+        </p:txBody>
+      </p:sp>
+      <p:sp>
+        <p:nvSpPr>
+          <p:cNvPr id="62" name="Rectangle: Rounded Corners 61">
+            <a:extLst>
+              <a:ext uri="{FF2B5EF4-FFF2-40B4-BE49-F238E27FC236}">
+                <a16:creationId xmlns:a16="http://schemas.microsoft.com/office/drawing/2014/main" id="{B0B31591-EE82-3CC3-928E-5F5B599C8B29}"/>
+              </a:ext>
+            </a:extLst>
+          </p:cNvPr>
+          <p:cNvSpPr/>
+          <p:nvPr/>
+        </p:nvSpPr>
+        <p:spPr>
+          <a:xfrm>
+            <a:off x="5101803" y="2628368"/>
+            <a:ext cx="2088261" cy="476644"/>
+          </a:xfrm>
+          <a:prstGeom prst="roundRect">
+            <a:avLst/>
+          </a:prstGeom>
+          <a:solidFill>
+            <a:srgbClr val="C2E8F7"/>
+          </a:solidFill>
+        </p:spPr>
+        <p:style>
+          <a:lnRef idx="2">
+            <a:schemeClr val="accent1">
+              <a:shade val="15000"/>
+            </a:schemeClr>
+          </a:lnRef>
+          <a:fillRef idx="1">
+            <a:schemeClr val="accent1"/>
+          </a:fillRef>
+          <a:effectRef idx="0">
+            <a:schemeClr val="accent1"/>
+          </a:effectRef>
+          <a:fontRef idx="minor">
+            <a:schemeClr val="lt1"/>
+          </a:fontRef>
+        </p:style>
+        <p:txBody>
+          <a:bodyPr rtlCol="0" anchor="ctr"/>
+          <a:lstStyle/>
+          <a:p>
+            <a:pPr algn="ctr"/>
+            <a:endParaRPr lang="en-US"/>
+          </a:p>
+        </p:txBody>
+      </p:sp>
+      <p:sp>
+        <p:nvSpPr>
+          <p:cNvPr id="63" name="TextBox 62">
+            <a:extLst>
+              <a:ext uri="{FF2B5EF4-FFF2-40B4-BE49-F238E27FC236}">
+                <a16:creationId xmlns:a16="http://schemas.microsoft.com/office/drawing/2014/main" id="{8C04D672-0C54-3141-1288-0DDB772B03C3}"/>
+              </a:ext>
+            </a:extLst>
+          </p:cNvPr>
+          <p:cNvSpPr txBox="1"/>
+          <p:nvPr/>
+        </p:nvSpPr>
+        <p:spPr>
+          <a:xfrm>
+            <a:off x="5414413" y="2682705"/>
+            <a:ext cx="1463040" cy="369332"/>
+          </a:xfrm>
+          <a:prstGeom prst="rect">
+            <a:avLst/>
+          </a:prstGeom>
+          <a:noFill/>
+        </p:spPr>
+        <p:txBody>
+          <a:bodyPr wrap="square" rtlCol="0">
+            <a:spAutoFit/>
+          </a:bodyPr>
+          <a:lstStyle/>
+          <a:p>
+            <a:pPr algn="ctr"/>
+            <a:r>
+              <a:rPr lang="en-US" dirty="0"/>
+              <a:t>SwiGLU</a:t>
+            </a:r>
+          </a:p>
+        </p:txBody>
+      </p:sp>
+      <p:cxnSp>
+        <p:nvCxnSpPr>
+          <p:cNvPr id="64" name="Straight Arrow Connector 63">
+            <a:extLst>
+              <a:ext uri="{FF2B5EF4-FFF2-40B4-BE49-F238E27FC236}">
+                <a16:creationId xmlns:a16="http://schemas.microsoft.com/office/drawing/2014/main" id="{EB9978DC-711D-40F4-77F0-972EBE5BA39F}"/>
+              </a:ext>
+            </a:extLst>
+          </p:cNvPr>
+          <p:cNvCxnSpPr>
+            <a:cxnSpLocks/>
+            <a:stCxn id="53" idx="0"/>
+            <a:endCxn id="60" idx="2"/>
+          </p:cNvCxnSpPr>
+          <p:nvPr/>
+        </p:nvCxnSpPr>
+        <p:spPr>
+          <a:xfrm flipV="1">
+            <a:off x="6145934" y="3955392"/>
+            <a:ext cx="1" cy="393923"/>
+          </a:xfrm>
+          <a:prstGeom prst="straightConnector1">
+            <a:avLst/>
+          </a:prstGeom>
+          <a:ln>
+            <a:tailEnd type="triangle"/>
+          </a:ln>
+        </p:spPr>
+        <p:style>
+          <a:lnRef idx="2">
+            <a:schemeClr val="dk1"/>
+          </a:lnRef>
+          <a:fillRef idx="0">
+            <a:schemeClr val="dk1"/>
+          </a:fillRef>
+          <a:effectRef idx="1">
+            <a:schemeClr val="dk1"/>
+          </a:effectRef>
+          <a:fontRef idx="minor">
+            <a:schemeClr val="tx1"/>
+          </a:fontRef>
+        </p:style>
+      </p:cxnSp>
+      <p:cxnSp>
+        <p:nvCxnSpPr>
+          <p:cNvPr id="65" name="Straight Arrow Connector 64">
+            <a:extLst>
+              <a:ext uri="{FF2B5EF4-FFF2-40B4-BE49-F238E27FC236}">
+                <a16:creationId xmlns:a16="http://schemas.microsoft.com/office/drawing/2014/main" id="{66A0F537-2ACA-CE73-5DCB-9DD261D61947}"/>
+              </a:ext>
+            </a:extLst>
+          </p:cNvPr>
+          <p:cNvCxnSpPr>
+            <a:cxnSpLocks/>
+          </p:cNvCxnSpPr>
+          <p:nvPr/>
+        </p:nvCxnSpPr>
+        <p:spPr>
+          <a:xfrm flipV="1">
+            <a:off x="6145933" y="3105013"/>
+            <a:ext cx="1" cy="365760"/>
+          </a:xfrm>
+          <a:prstGeom prst="straightConnector1">
+            <a:avLst/>
+          </a:prstGeom>
+          <a:ln>
+            <a:tailEnd type="triangle"/>
+          </a:ln>
+        </p:spPr>
+        <p:style>
+          <a:lnRef idx="2">
+            <a:schemeClr val="dk1"/>
+          </a:lnRef>
+          <a:fillRef idx="0">
+            <a:schemeClr val="dk1"/>
+          </a:fillRef>
+          <a:effectRef idx="1">
+            <a:schemeClr val="dk1"/>
+          </a:effectRef>
+          <a:fontRef idx="minor">
+            <a:schemeClr val="tx1"/>
+          </a:fontRef>
+        </p:style>
+      </p:cxnSp>
+      <p:sp>
+        <p:nvSpPr>
+          <p:cNvPr id="66" name="Oval 65">
+            <a:extLst>
+              <a:ext uri="{FF2B5EF4-FFF2-40B4-BE49-F238E27FC236}">
+                <a16:creationId xmlns:a16="http://schemas.microsoft.com/office/drawing/2014/main" id="{83319994-F9BD-0F91-AD7E-1004F4704D96}"/>
+              </a:ext>
+            </a:extLst>
+          </p:cNvPr>
+          <p:cNvSpPr/>
+          <p:nvPr/>
+        </p:nvSpPr>
+        <p:spPr>
+          <a:xfrm>
+            <a:off x="5521860" y="4883835"/>
+            <a:ext cx="173932" cy="181173"/>
+          </a:xfrm>
+          <a:prstGeom prst="ellipse">
+            <a:avLst/>
+          </a:prstGeom>
+          <a:noFill/>
+        </p:spPr>
+        <p:style>
+          <a:lnRef idx="2">
+            <a:schemeClr val="accent1">
+              <a:shade val="15000"/>
+            </a:schemeClr>
+          </a:lnRef>
+          <a:fillRef idx="1">
+            <a:schemeClr val="accent1"/>
+          </a:fillRef>
+          <a:effectRef idx="0">
+            <a:schemeClr val="accent1"/>
+          </a:effectRef>
+          <a:fontRef idx="minor">
+            <a:schemeClr val="lt1"/>
+          </a:fontRef>
+        </p:style>
+        <p:txBody>
+          <a:bodyPr rtlCol="0" anchor="ctr"/>
+          <a:lstStyle/>
+          <a:p>
+            <a:pPr algn="ctr"/>
+            <a:endParaRPr lang="en-US"/>
+          </a:p>
+        </p:txBody>
+      </p:sp>
+      <p:sp>
+        <p:nvSpPr>
+          <p:cNvPr id="67" name="Freeform: Shape 66">
+            <a:extLst>
+              <a:ext uri="{FF2B5EF4-FFF2-40B4-BE49-F238E27FC236}">
+                <a16:creationId xmlns:a16="http://schemas.microsoft.com/office/drawing/2014/main" id="{EAAE16CA-058D-865B-72DD-4349BD15D7A4}"/>
+              </a:ext>
+            </a:extLst>
+          </p:cNvPr>
+          <p:cNvSpPr/>
+          <p:nvPr/>
+        </p:nvSpPr>
+        <p:spPr>
+          <a:xfrm>
+            <a:off x="5528646" y="4922140"/>
+            <a:ext cx="145614" cy="100173"/>
+          </a:xfrm>
+          <a:custGeom>
+            <a:avLst/>
+            <a:gdLst>
+              <a:gd name="connsiteX0" fmla="*/ 0 w 274320"/>
+              <a:gd name="connsiteY0" fmla="*/ 0 h 181172"/>
+              <a:gd name="connsiteX1" fmla="*/ 100584 w 274320"/>
+              <a:gd name="connsiteY1" fmla="*/ 27432 h 181172"/>
+              <a:gd name="connsiteX2" fmla="*/ 146304 w 274320"/>
+              <a:gd name="connsiteY2" fmla="*/ 164592 h 181172"/>
+              <a:gd name="connsiteX3" fmla="*/ 274320 w 274320"/>
+              <a:gd name="connsiteY3" fmla="*/ 173736 h 181172"/>
+            </a:gdLst>
+            <a:ahLst/>
+            <a:cxnLst>
+              <a:cxn ang="0">
+                <a:pos x="connsiteX0" y="connsiteY0"/>
+              </a:cxn>
+              <a:cxn ang="0">
+                <a:pos x="connsiteX1" y="connsiteY1"/>
+              </a:cxn>
+              <a:cxn ang="0">
+                <a:pos x="connsiteX2" y="connsiteY2"/>
+              </a:cxn>
+              <a:cxn ang="0">
+                <a:pos x="connsiteX3" y="connsiteY3"/>
+              </a:cxn>
+            </a:cxnLst>
+            <a:rect l="l" t="t" r="r" b="b"/>
+            <a:pathLst>
+              <a:path w="274320" h="181172">
+                <a:moveTo>
+                  <a:pt x="0" y="0"/>
+                </a:moveTo>
+                <a:cubicBezTo>
+                  <a:pt x="38100" y="0"/>
+                  <a:pt x="76200" y="0"/>
+                  <a:pt x="100584" y="27432"/>
+                </a:cubicBezTo>
+                <a:cubicBezTo>
+                  <a:pt x="124968" y="54864"/>
+                  <a:pt x="117348" y="140208"/>
+                  <a:pt x="146304" y="164592"/>
+                </a:cubicBezTo>
+                <a:cubicBezTo>
+                  <a:pt x="175260" y="188976"/>
+                  <a:pt x="224790" y="181356"/>
+                  <a:pt x="274320" y="173736"/>
+                </a:cubicBezTo>
+              </a:path>
+            </a:pathLst>
+          </a:custGeom>
+          <a:noFill/>
+        </p:spPr>
+        <p:style>
+          <a:lnRef idx="2">
+            <a:schemeClr val="accent1">
+              <a:shade val="15000"/>
+            </a:schemeClr>
+          </a:lnRef>
+          <a:fillRef idx="1">
+            <a:schemeClr val="accent1"/>
+          </a:fillRef>
+          <a:effectRef idx="0">
+            <a:schemeClr val="accent1"/>
+          </a:effectRef>
+          <a:fontRef idx="minor">
+            <a:schemeClr val="lt1"/>
+          </a:fontRef>
+        </p:style>
+        <p:txBody>
+          <a:bodyPr rtlCol="0" anchor="ctr"/>
+          <a:lstStyle/>
+          <a:p>
+            <a:pPr algn="ctr"/>
+            <a:endParaRPr lang="en-US"/>
+          </a:p>
+        </p:txBody>
+      </p:sp>
+      <p:sp>
+        <p:nvSpPr>
+          <p:cNvPr id="68" name="Oval 67">
+            <a:extLst>
+              <a:ext uri="{FF2B5EF4-FFF2-40B4-BE49-F238E27FC236}">
+                <a16:creationId xmlns:a16="http://schemas.microsoft.com/office/drawing/2014/main" id="{B9924E5F-7165-CA3F-65BC-D5688175DBE7}"/>
+              </a:ext>
+            </a:extLst>
+          </p:cNvPr>
+          <p:cNvSpPr/>
+          <p:nvPr/>
+        </p:nvSpPr>
+        <p:spPr>
+          <a:xfrm>
+            <a:off x="6395006" y="4880852"/>
+            <a:ext cx="173932" cy="181173"/>
+          </a:xfrm>
+          <a:prstGeom prst="ellipse">
+            <a:avLst/>
+          </a:prstGeom>
+          <a:noFill/>
+        </p:spPr>
+        <p:style>
+          <a:lnRef idx="2">
+            <a:schemeClr val="accent1">
+              <a:shade val="15000"/>
+            </a:schemeClr>
+          </a:lnRef>
+          <a:fillRef idx="1">
+            <a:schemeClr val="accent1"/>
+          </a:fillRef>
+          <a:effectRef idx="0">
+            <a:schemeClr val="accent1"/>
+          </a:effectRef>
+          <a:fontRef idx="minor">
+            <a:schemeClr val="lt1"/>
+          </a:fontRef>
+        </p:style>
+        <p:txBody>
+          <a:bodyPr rtlCol="0" anchor="ctr"/>
+          <a:lstStyle/>
+          <a:p>
+            <a:pPr algn="ctr"/>
+            <a:endParaRPr lang="en-US"/>
+          </a:p>
+        </p:txBody>
+      </p:sp>
+      <p:sp>
+        <p:nvSpPr>
+          <p:cNvPr id="69" name="Freeform: Shape 68">
+            <a:extLst>
+              <a:ext uri="{FF2B5EF4-FFF2-40B4-BE49-F238E27FC236}">
+                <a16:creationId xmlns:a16="http://schemas.microsoft.com/office/drawing/2014/main" id="{AB47E292-8CBD-2887-45D8-9F9AF87FAED3}"/>
+              </a:ext>
+            </a:extLst>
+          </p:cNvPr>
+          <p:cNvSpPr/>
+          <p:nvPr/>
+        </p:nvSpPr>
+        <p:spPr>
+          <a:xfrm>
+            <a:off x="6423324" y="4909625"/>
+            <a:ext cx="145614" cy="100173"/>
+          </a:xfrm>
+          <a:custGeom>
+            <a:avLst/>
+            <a:gdLst>
+              <a:gd name="connsiteX0" fmla="*/ 0 w 274320"/>
+              <a:gd name="connsiteY0" fmla="*/ 0 h 181172"/>
+              <a:gd name="connsiteX1" fmla="*/ 100584 w 274320"/>
+              <a:gd name="connsiteY1" fmla="*/ 27432 h 181172"/>
+              <a:gd name="connsiteX2" fmla="*/ 146304 w 274320"/>
+              <a:gd name="connsiteY2" fmla="*/ 164592 h 181172"/>
+              <a:gd name="connsiteX3" fmla="*/ 274320 w 274320"/>
+              <a:gd name="connsiteY3" fmla="*/ 173736 h 181172"/>
+            </a:gdLst>
+            <a:ahLst/>
+            <a:cxnLst>
+              <a:cxn ang="0">
+                <a:pos x="connsiteX0" y="connsiteY0"/>
+              </a:cxn>
+              <a:cxn ang="0">
+                <a:pos x="connsiteX1" y="connsiteY1"/>
+              </a:cxn>
+              <a:cxn ang="0">
+                <a:pos x="connsiteX2" y="connsiteY2"/>
+              </a:cxn>
+              <a:cxn ang="0">
+                <a:pos x="connsiteX3" y="connsiteY3"/>
+              </a:cxn>
+            </a:cxnLst>
+            <a:rect l="l" t="t" r="r" b="b"/>
+            <a:pathLst>
+              <a:path w="274320" h="181172">
+                <a:moveTo>
+                  <a:pt x="0" y="0"/>
+                </a:moveTo>
+                <a:cubicBezTo>
+                  <a:pt x="38100" y="0"/>
+                  <a:pt x="76200" y="0"/>
+                  <a:pt x="100584" y="27432"/>
+                </a:cubicBezTo>
+                <a:cubicBezTo>
+                  <a:pt x="124968" y="54864"/>
+                  <a:pt x="117348" y="140208"/>
+                  <a:pt x="146304" y="164592"/>
+                </a:cubicBezTo>
+                <a:cubicBezTo>
+                  <a:pt x="175260" y="188976"/>
+                  <a:pt x="224790" y="181356"/>
+                  <a:pt x="274320" y="173736"/>
+                </a:cubicBezTo>
+              </a:path>
+            </a:pathLst>
+          </a:custGeom>
+          <a:noFill/>
+        </p:spPr>
+        <p:style>
+          <a:lnRef idx="2">
+            <a:schemeClr val="accent1">
+              <a:shade val="15000"/>
+            </a:schemeClr>
+          </a:lnRef>
+          <a:fillRef idx="1">
+            <a:schemeClr val="accent1"/>
+          </a:fillRef>
+          <a:effectRef idx="0">
+            <a:schemeClr val="accent1"/>
+          </a:effectRef>
+          <a:fontRef idx="minor">
+            <a:schemeClr val="lt1"/>
+          </a:fontRef>
+        </p:style>
+        <p:txBody>
+          <a:bodyPr rtlCol="0" anchor="ctr"/>
+          <a:lstStyle/>
+          <a:p>
+            <a:pPr algn="ctr"/>
+            <a:endParaRPr lang="en-US"/>
+          </a:p>
+        </p:txBody>
+      </p:sp>
+      <p:sp>
+        <p:nvSpPr>
+          <p:cNvPr id="70" name="TextBox 69">
+            <a:extLst>
+              <a:ext uri="{FF2B5EF4-FFF2-40B4-BE49-F238E27FC236}">
+                <a16:creationId xmlns:a16="http://schemas.microsoft.com/office/drawing/2014/main" id="{4A416DCE-D664-655E-4ED9-97629CF36471}"/>
+              </a:ext>
+            </a:extLst>
+          </p:cNvPr>
+          <p:cNvSpPr txBox="1"/>
+          <p:nvPr/>
+        </p:nvSpPr>
+        <p:spPr>
+          <a:xfrm>
+            <a:off x="5227188" y="4795855"/>
+            <a:ext cx="215837" cy="369332"/>
+          </a:xfrm>
+          <a:prstGeom prst="rect">
+            <a:avLst/>
+          </a:prstGeom>
+          <a:noFill/>
+        </p:spPr>
+        <p:txBody>
+          <a:bodyPr wrap="square" rtlCol="0">
+            <a:spAutoFit/>
+          </a:bodyPr>
+          <a:lstStyle/>
+          <a:p>
+            <a:r>
+              <a:rPr lang="en-US" dirty="0"/>
+              <a:t>Q</a:t>
+            </a:r>
+          </a:p>
+        </p:txBody>
+      </p:sp>
+      <p:sp>
+        <p:nvSpPr>
+          <p:cNvPr id="71" name="TextBox 70">
+            <a:extLst>
+              <a:ext uri="{FF2B5EF4-FFF2-40B4-BE49-F238E27FC236}">
+                <a16:creationId xmlns:a16="http://schemas.microsoft.com/office/drawing/2014/main" id="{C1AD2763-A5BA-CBE6-10A1-03458C89EF57}"/>
+              </a:ext>
+            </a:extLst>
+          </p:cNvPr>
+          <p:cNvSpPr txBox="1"/>
+          <p:nvPr/>
+        </p:nvSpPr>
+        <p:spPr>
+          <a:xfrm>
+            <a:off x="6142239" y="4799345"/>
+            <a:ext cx="215837" cy="369332"/>
+          </a:xfrm>
+          <a:prstGeom prst="rect">
+            <a:avLst/>
+          </a:prstGeom>
+          <a:noFill/>
+        </p:spPr>
+        <p:txBody>
+          <a:bodyPr wrap="square" rtlCol="0">
+            <a:spAutoFit/>
+          </a:bodyPr>
+          <a:lstStyle/>
+          <a:p>
+            <a:r>
+              <a:rPr lang="en-US" dirty="0"/>
+              <a:t>K</a:t>
+            </a:r>
+          </a:p>
+        </p:txBody>
+      </p:sp>
+      <p:sp>
+        <p:nvSpPr>
+          <p:cNvPr id="72" name="TextBox 71">
+            <a:extLst>
+              <a:ext uri="{FF2B5EF4-FFF2-40B4-BE49-F238E27FC236}">
+                <a16:creationId xmlns:a16="http://schemas.microsoft.com/office/drawing/2014/main" id="{BFCE2A3A-57A0-885C-DFB6-CA1EFD5FEC99}"/>
+              </a:ext>
+            </a:extLst>
+          </p:cNvPr>
+          <p:cNvSpPr txBox="1"/>
+          <p:nvPr/>
+        </p:nvSpPr>
+        <p:spPr>
+          <a:xfrm>
+            <a:off x="6992692" y="4797129"/>
+            <a:ext cx="215837" cy="369332"/>
+          </a:xfrm>
+          <a:prstGeom prst="rect">
+            <a:avLst/>
+          </a:prstGeom>
+          <a:noFill/>
+        </p:spPr>
+        <p:txBody>
+          <a:bodyPr wrap="square" rtlCol="0">
+            <a:spAutoFit/>
+          </a:bodyPr>
+          <a:lstStyle/>
+          <a:p>
+            <a:r>
+              <a:rPr lang="en-US" dirty="0"/>
+              <a:t>V</a:t>
+            </a:r>
+          </a:p>
+        </p:txBody>
+      </p:sp>
+      <p:cxnSp>
+        <p:nvCxnSpPr>
+          <p:cNvPr id="73" name="Straight Arrow Connector 72">
+            <a:extLst>
+              <a:ext uri="{FF2B5EF4-FFF2-40B4-BE49-F238E27FC236}">
+                <a16:creationId xmlns:a16="http://schemas.microsoft.com/office/drawing/2014/main" id="{02B5371D-78E7-EBE5-04B3-0563201378B6}"/>
+              </a:ext>
+            </a:extLst>
+          </p:cNvPr>
+          <p:cNvCxnSpPr>
+            <a:cxnSpLocks/>
+          </p:cNvCxnSpPr>
+          <p:nvPr/>
+        </p:nvCxnSpPr>
+        <p:spPr>
+          <a:xfrm flipV="1">
+            <a:off x="6142238" y="2262052"/>
+            <a:ext cx="1" cy="365760"/>
+          </a:xfrm>
+          <a:prstGeom prst="straightConnector1">
+            <a:avLst/>
+          </a:prstGeom>
+          <a:ln>
+            <a:tailEnd type="triangle"/>
+          </a:ln>
+        </p:spPr>
+        <p:style>
+          <a:lnRef idx="2">
+            <a:schemeClr val="dk1"/>
+          </a:lnRef>
+          <a:fillRef idx="0">
+            <a:schemeClr val="dk1"/>
+          </a:fillRef>
+          <a:effectRef idx="1">
+            <a:schemeClr val="dk1"/>
+          </a:effectRef>
+          <a:fontRef idx="minor">
+            <a:schemeClr val="tx1"/>
+          </a:fontRef>
+        </p:style>
+      </p:cxnSp>
+      <p:cxnSp>
+        <p:nvCxnSpPr>
+          <p:cNvPr id="74" name="Connector: Elbow 73">
+            <a:extLst>
+              <a:ext uri="{FF2B5EF4-FFF2-40B4-BE49-F238E27FC236}">
+                <a16:creationId xmlns:a16="http://schemas.microsoft.com/office/drawing/2014/main" id="{0F8552B0-E466-5A5B-9B8F-2E57E4D2144D}"/>
+              </a:ext>
+            </a:extLst>
+          </p:cNvPr>
+          <p:cNvCxnSpPr>
+            <a:cxnSpLocks/>
+          </p:cNvCxnSpPr>
+          <p:nvPr/>
+        </p:nvCxnSpPr>
+        <p:spPr>
+          <a:xfrm rot="16200000" flipH="1">
+            <a:off x="4741712" y="4473352"/>
+            <a:ext cx="1700307" cy="1127828"/>
+          </a:xfrm>
+          <a:prstGeom prst="bentConnector3">
+            <a:avLst>
+              <a:gd name="adj1" fmla="val 98401"/>
+            </a:avLst>
+          </a:prstGeom>
+        </p:spPr>
+        <p:style>
+          <a:lnRef idx="2">
+            <a:schemeClr val="dk1"/>
+          </a:lnRef>
+          <a:fillRef idx="0">
+            <a:schemeClr val="dk1"/>
+          </a:fillRef>
+          <a:effectRef idx="1">
+            <a:schemeClr val="dk1"/>
+          </a:effectRef>
+          <a:fontRef idx="minor">
+            <a:schemeClr val="tx1"/>
+          </a:fontRef>
+        </p:style>
+      </p:cxnSp>
+      <p:cxnSp>
+        <p:nvCxnSpPr>
+          <p:cNvPr id="75" name="Straight Arrow Connector 74">
+            <a:extLst>
+              <a:ext uri="{FF2B5EF4-FFF2-40B4-BE49-F238E27FC236}">
+                <a16:creationId xmlns:a16="http://schemas.microsoft.com/office/drawing/2014/main" id="{CD7E1153-37C9-F8F6-E118-D355A82FAC25}"/>
+              </a:ext>
+            </a:extLst>
+          </p:cNvPr>
+          <p:cNvCxnSpPr/>
+          <p:nvPr/>
+        </p:nvCxnSpPr>
+        <p:spPr>
+          <a:xfrm>
+            <a:off x="5018342" y="4187112"/>
+            <a:ext cx="1130642" cy="0"/>
+          </a:xfrm>
+          <a:prstGeom prst="straightConnector1">
+            <a:avLst/>
+          </a:prstGeom>
+          <a:ln>
+            <a:tailEnd type="triangle"/>
+          </a:ln>
+        </p:spPr>
+        <p:style>
+          <a:lnRef idx="2">
+            <a:schemeClr val="dk1"/>
+          </a:lnRef>
+          <a:fillRef idx="0">
+            <a:schemeClr val="dk1"/>
+          </a:fillRef>
+          <a:effectRef idx="1">
+            <a:schemeClr val="dk1"/>
+          </a:effectRef>
+          <a:fontRef idx="minor">
+            <a:schemeClr val="tx1"/>
+          </a:fontRef>
+        </p:style>
+      </p:cxnSp>
+      <p:cxnSp>
+        <p:nvCxnSpPr>
+          <p:cNvPr id="76" name="Connector: Elbow 75">
+            <a:extLst>
+              <a:ext uri="{FF2B5EF4-FFF2-40B4-BE49-F238E27FC236}">
+                <a16:creationId xmlns:a16="http://schemas.microsoft.com/office/drawing/2014/main" id="{2659A311-417F-C8D5-79A3-3C9929EADD91}"/>
+              </a:ext>
+            </a:extLst>
+          </p:cNvPr>
+          <p:cNvCxnSpPr>
+            <a:cxnSpLocks/>
+          </p:cNvCxnSpPr>
+          <p:nvPr/>
+        </p:nvCxnSpPr>
+        <p:spPr>
+          <a:xfrm rot="16200000" flipH="1">
+            <a:off x="4784178" y="2749947"/>
+            <a:ext cx="1632752" cy="1106471"/>
+          </a:xfrm>
+          <a:prstGeom prst="bentConnector3">
+            <a:avLst>
+              <a:gd name="adj1" fmla="val 99843"/>
+            </a:avLst>
+          </a:prstGeom>
+        </p:spPr>
+        <p:style>
+          <a:lnRef idx="2">
+            <a:schemeClr val="dk1"/>
+          </a:lnRef>
+          <a:fillRef idx="0">
+            <a:schemeClr val="dk1"/>
+          </a:fillRef>
+          <a:effectRef idx="1">
+            <a:schemeClr val="dk1"/>
+          </a:effectRef>
+          <a:fontRef idx="minor">
+            <a:schemeClr val="tx1"/>
+          </a:fontRef>
+        </p:style>
+      </p:cxnSp>
+      <p:cxnSp>
+        <p:nvCxnSpPr>
+          <p:cNvPr id="77" name="Straight Arrow Connector 76">
+            <a:extLst>
+              <a:ext uri="{FF2B5EF4-FFF2-40B4-BE49-F238E27FC236}">
+                <a16:creationId xmlns:a16="http://schemas.microsoft.com/office/drawing/2014/main" id="{9505D795-3116-74A5-1C4F-D40A6CAD9E03}"/>
+              </a:ext>
+            </a:extLst>
+          </p:cNvPr>
+          <p:cNvCxnSpPr>
+            <a:cxnSpLocks/>
+          </p:cNvCxnSpPr>
+          <p:nvPr/>
+        </p:nvCxnSpPr>
+        <p:spPr>
+          <a:xfrm>
+            <a:off x="5043505" y="2485845"/>
+            <a:ext cx="1098733" cy="961"/>
+          </a:xfrm>
+          <a:prstGeom prst="straightConnector1">
+            <a:avLst/>
+          </a:prstGeom>
+          <a:ln>
+            <a:tailEnd type="triangle"/>
+          </a:ln>
+        </p:spPr>
+        <p:style>
+          <a:lnRef idx="2">
+            <a:schemeClr val="dk1"/>
+          </a:lnRef>
+          <a:fillRef idx="0">
+            <a:schemeClr val="dk1"/>
+          </a:fillRef>
+          <a:effectRef idx="1">
+            <a:schemeClr val="dk1"/>
+          </a:effectRef>
+          <a:fontRef idx="minor">
+            <a:schemeClr val="tx1"/>
+          </a:fontRef>
+        </p:style>
+      </p:cxnSp>
+      <p:sp>
+        <p:nvSpPr>
+          <p:cNvPr id="78" name="Plus Sign 77">
+            <a:extLst>
+              <a:ext uri="{FF2B5EF4-FFF2-40B4-BE49-F238E27FC236}">
+                <a16:creationId xmlns:a16="http://schemas.microsoft.com/office/drawing/2014/main" id="{5418572A-6A14-3316-6734-A38DE8E73B25}"/>
+              </a:ext>
+            </a:extLst>
+          </p:cNvPr>
+          <p:cNvSpPr/>
+          <p:nvPr/>
+        </p:nvSpPr>
+        <p:spPr>
+          <a:xfrm>
+            <a:off x="6189261" y="4118632"/>
+            <a:ext cx="135333" cy="133763"/>
+          </a:xfrm>
+          <a:prstGeom prst="mathPlus">
+            <a:avLst/>
+          </a:prstGeom>
+          <a:solidFill>
+            <a:schemeClr val="tx1"/>
+          </a:solidFill>
+        </p:spPr>
+        <p:style>
+          <a:lnRef idx="2">
+            <a:schemeClr val="accent1">
+              <a:shade val="15000"/>
+            </a:schemeClr>
+          </a:lnRef>
+          <a:fillRef idx="1">
+            <a:schemeClr val="accent1"/>
+          </a:fillRef>
+          <a:effectRef idx="0">
+            <a:schemeClr val="accent1"/>
+          </a:effectRef>
+          <a:fontRef idx="minor">
+            <a:schemeClr val="lt1"/>
+          </a:fontRef>
+        </p:style>
+        <p:txBody>
+          <a:bodyPr rtlCol="0" anchor="ctr"/>
+          <a:lstStyle/>
+          <a:p>
+            <a:pPr algn="ctr"/>
+            <a:endParaRPr lang="en-US"/>
+          </a:p>
+        </p:txBody>
+      </p:sp>
+      <p:sp>
+        <p:nvSpPr>
+          <p:cNvPr id="79" name="Plus Sign 78">
+            <a:extLst>
+              <a:ext uri="{FF2B5EF4-FFF2-40B4-BE49-F238E27FC236}">
+                <a16:creationId xmlns:a16="http://schemas.microsoft.com/office/drawing/2014/main" id="{50FC8CB2-4FAA-8506-E054-729CC3FA4D8A}"/>
+              </a:ext>
+            </a:extLst>
+          </p:cNvPr>
+          <p:cNvSpPr/>
+          <p:nvPr/>
+        </p:nvSpPr>
+        <p:spPr>
+          <a:xfrm>
+            <a:off x="6165958" y="2423215"/>
+            <a:ext cx="135333" cy="133763"/>
+          </a:xfrm>
+          <a:prstGeom prst="mathPlus">
+            <a:avLst/>
+          </a:prstGeom>
+          <a:solidFill>
+            <a:schemeClr val="tx1"/>
+          </a:solidFill>
+        </p:spPr>
+        <p:style>
+          <a:lnRef idx="2">
+            <a:schemeClr val="accent1">
+              <a:shade val="15000"/>
+            </a:schemeClr>
+          </a:lnRef>
+          <a:fillRef idx="1">
+            <a:schemeClr val="accent1"/>
+          </a:fillRef>
+          <a:effectRef idx="0">
+            <a:schemeClr val="accent1"/>
+          </a:effectRef>
+          <a:fontRef idx="minor">
+            <a:schemeClr val="lt1"/>
+          </a:fontRef>
+        </p:style>
+        <p:txBody>
+          <a:bodyPr rtlCol="0" anchor="ctr"/>
+          <a:lstStyle/>
+          <a:p>
+            <a:pPr algn="ctr"/>
+            <a:endParaRPr lang="en-US"/>
+          </a:p>
+        </p:txBody>
+      </p:sp>
+      <p:sp>
+        <p:nvSpPr>
+          <p:cNvPr id="80" name="Oval 79">
+            <a:extLst>
+              <a:ext uri="{FF2B5EF4-FFF2-40B4-BE49-F238E27FC236}">
+                <a16:creationId xmlns:a16="http://schemas.microsoft.com/office/drawing/2014/main" id="{48B296DB-2FC7-F767-927C-4BCD05318F7A}"/>
+              </a:ext>
+            </a:extLst>
+          </p:cNvPr>
+          <p:cNvSpPr/>
+          <p:nvPr/>
+        </p:nvSpPr>
+        <p:spPr>
+          <a:xfrm>
+            <a:off x="8431828" y="3476751"/>
+            <a:ext cx="173932" cy="181173"/>
+          </a:xfrm>
+          <a:prstGeom prst="ellipse">
+            <a:avLst/>
+          </a:prstGeom>
+          <a:noFill/>
+        </p:spPr>
+        <p:style>
+          <a:lnRef idx="2">
+            <a:schemeClr val="accent1">
+              <a:shade val="15000"/>
+            </a:schemeClr>
+          </a:lnRef>
+          <a:fillRef idx="1">
+            <a:schemeClr val="accent1"/>
+          </a:fillRef>
+          <a:effectRef idx="0">
+            <a:schemeClr val="accent1"/>
+          </a:effectRef>
+          <a:fontRef idx="minor">
+            <a:schemeClr val="lt1"/>
+          </a:fontRef>
+        </p:style>
+        <p:txBody>
+          <a:bodyPr rtlCol="0" anchor="ctr"/>
+          <a:lstStyle/>
+          <a:p>
+            <a:pPr algn="ctr"/>
+            <a:endParaRPr lang="en-US"/>
+          </a:p>
+        </p:txBody>
+      </p:sp>
+      <p:sp>
+        <p:nvSpPr>
+          <p:cNvPr id="81" name="Freeform: Shape 80">
+            <a:extLst>
+              <a:ext uri="{FF2B5EF4-FFF2-40B4-BE49-F238E27FC236}">
+                <a16:creationId xmlns:a16="http://schemas.microsoft.com/office/drawing/2014/main" id="{DA74BEF0-89C6-A89F-0C09-5535A6DAC0FE}"/>
+              </a:ext>
+            </a:extLst>
+          </p:cNvPr>
+          <p:cNvSpPr/>
+          <p:nvPr/>
+        </p:nvSpPr>
+        <p:spPr>
+          <a:xfrm>
+            <a:off x="8460146" y="3505524"/>
+            <a:ext cx="145614" cy="100173"/>
+          </a:xfrm>
+          <a:custGeom>
+            <a:avLst/>
+            <a:gdLst>
+              <a:gd name="connsiteX0" fmla="*/ 0 w 274320"/>
+              <a:gd name="connsiteY0" fmla="*/ 0 h 181172"/>
+              <a:gd name="connsiteX1" fmla="*/ 100584 w 274320"/>
+              <a:gd name="connsiteY1" fmla="*/ 27432 h 181172"/>
+              <a:gd name="connsiteX2" fmla="*/ 146304 w 274320"/>
+              <a:gd name="connsiteY2" fmla="*/ 164592 h 181172"/>
+              <a:gd name="connsiteX3" fmla="*/ 274320 w 274320"/>
+              <a:gd name="connsiteY3" fmla="*/ 173736 h 181172"/>
+            </a:gdLst>
+            <a:ahLst/>
+            <a:cxnLst>
+              <a:cxn ang="0">
+                <a:pos x="connsiteX0" y="connsiteY0"/>
+              </a:cxn>
+              <a:cxn ang="0">
+                <a:pos x="connsiteX1" y="connsiteY1"/>
+              </a:cxn>
+              <a:cxn ang="0">
+                <a:pos x="connsiteX2" y="connsiteY2"/>
+              </a:cxn>
+              <a:cxn ang="0">
+                <a:pos x="connsiteX3" y="connsiteY3"/>
+              </a:cxn>
+            </a:cxnLst>
+            <a:rect l="l" t="t" r="r" b="b"/>
+            <a:pathLst>
+              <a:path w="274320" h="181172">
+                <a:moveTo>
+                  <a:pt x="0" y="0"/>
+                </a:moveTo>
+                <a:cubicBezTo>
+                  <a:pt x="38100" y="0"/>
+                  <a:pt x="76200" y="0"/>
+                  <a:pt x="100584" y="27432"/>
+                </a:cubicBezTo>
+                <a:cubicBezTo>
+                  <a:pt x="124968" y="54864"/>
+                  <a:pt x="117348" y="140208"/>
+                  <a:pt x="146304" y="164592"/>
+                </a:cubicBezTo>
+                <a:cubicBezTo>
+                  <a:pt x="175260" y="188976"/>
+                  <a:pt x="224790" y="181356"/>
+                  <a:pt x="274320" y="173736"/>
+                </a:cubicBezTo>
+              </a:path>
+            </a:pathLst>
+          </a:custGeom>
+          <a:noFill/>
+        </p:spPr>
+        <p:style>
+          <a:lnRef idx="2">
+            <a:schemeClr val="accent1">
+              <a:shade val="15000"/>
+            </a:schemeClr>
+          </a:lnRef>
+          <a:fillRef idx="1">
+            <a:schemeClr val="accent1"/>
+          </a:fillRef>
+          <a:effectRef idx="0">
+            <a:schemeClr val="accent1"/>
+          </a:effectRef>
+          <a:fontRef idx="minor">
+            <a:schemeClr val="lt1"/>
+          </a:fontRef>
+        </p:style>
+        <p:txBody>
+          <a:bodyPr rtlCol="0" anchor="ctr"/>
+          <a:lstStyle/>
+          <a:p>
+            <a:pPr algn="ctr"/>
+            <a:endParaRPr lang="en-US"/>
+          </a:p>
+        </p:txBody>
+      </p:sp>
+      <p:sp>
+        <p:nvSpPr>
+          <p:cNvPr id="82" name="TextBox 81">
+            <a:extLst>
+              <a:ext uri="{FF2B5EF4-FFF2-40B4-BE49-F238E27FC236}">
+                <a16:creationId xmlns:a16="http://schemas.microsoft.com/office/drawing/2014/main" id="{69CE49CF-8598-5F62-6B89-AE3AB6EB3A33}"/>
+              </a:ext>
+            </a:extLst>
+          </p:cNvPr>
+          <p:cNvSpPr txBox="1"/>
+          <p:nvPr/>
+        </p:nvSpPr>
+        <p:spPr>
+          <a:xfrm>
+            <a:off x="8627290" y="3365107"/>
+            <a:ext cx="2816350" cy="369332"/>
+          </a:xfrm>
+          <a:prstGeom prst="rect">
+            <a:avLst/>
+          </a:prstGeom>
+          <a:noFill/>
+        </p:spPr>
+        <p:txBody>
+          <a:bodyPr wrap="square" rtlCol="0">
+            <a:spAutoFit/>
+          </a:bodyPr>
+          <a:lstStyle/>
+          <a:p>
+            <a:r>
+              <a:rPr lang="en-US" dirty="0"/>
+              <a:t>Rotary Operation Applied</a:t>
+            </a:r>
+          </a:p>
+        </p:txBody>
+      </p:sp>
+      <p:sp>
+        <p:nvSpPr>
+          <p:cNvPr id="83" name="Plus Sign 82">
+            <a:extLst>
+              <a:ext uri="{FF2B5EF4-FFF2-40B4-BE49-F238E27FC236}">
+                <a16:creationId xmlns:a16="http://schemas.microsoft.com/office/drawing/2014/main" id="{326DD9EE-525A-AA8B-295B-6CF59C3D0EC7}"/>
+              </a:ext>
+            </a:extLst>
+          </p:cNvPr>
+          <p:cNvSpPr/>
+          <p:nvPr/>
+        </p:nvSpPr>
+        <p:spPr>
+          <a:xfrm>
+            <a:off x="8438821" y="3950039"/>
+            <a:ext cx="135333" cy="133763"/>
+          </a:xfrm>
+          <a:prstGeom prst="mathPlus">
+            <a:avLst/>
+          </a:prstGeom>
+          <a:solidFill>
+            <a:schemeClr val="tx1"/>
+          </a:solidFill>
+        </p:spPr>
+        <p:style>
+          <a:lnRef idx="2">
+            <a:schemeClr val="accent1">
+              <a:shade val="15000"/>
+            </a:schemeClr>
+          </a:lnRef>
+          <a:fillRef idx="1">
+            <a:schemeClr val="accent1"/>
+          </a:fillRef>
+          <a:effectRef idx="0">
+            <a:schemeClr val="accent1"/>
+          </a:effectRef>
+          <a:fontRef idx="minor">
+            <a:schemeClr val="lt1"/>
+          </a:fontRef>
+        </p:style>
+        <p:txBody>
+          <a:bodyPr rtlCol="0" anchor="ctr"/>
+          <a:lstStyle/>
+          <a:p>
+            <a:pPr algn="ctr"/>
+            <a:endParaRPr lang="en-US" dirty="0"/>
+          </a:p>
+        </p:txBody>
+      </p:sp>
+      <p:sp>
+        <p:nvSpPr>
+          <p:cNvPr id="84" name="TextBox 83">
+            <a:extLst>
+              <a:ext uri="{FF2B5EF4-FFF2-40B4-BE49-F238E27FC236}">
+                <a16:creationId xmlns:a16="http://schemas.microsoft.com/office/drawing/2014/main" id="{6A254E78-1EB4-6B84-9026-DEC4EF84EB04}"/>
+              </a:ext>
+            </a:extLst>
+          </p:cNvPr>
+          <p:cNvSpPr txBox="1"/>
+          <p:nvPr/>
+        </p:nvSpPr>
+        <p:spPr>
+          <a:xfrm>
+            <a:off x="8626451" y="3849623"/>
+            <a:ext cx="2710340" cy="369332"/>
+          </a:xfrm>
+          <a:prstGeom prst="rect">
+            <a:avLst/>
+          </a:prstGeom>
+          <a:noFill/>
+        </p:spPr>
+        <p:txBody>
+          <a:bodyPr wrap="square" rtlCol="0">
+            <a:spAutoFit/>
+          </a:bodyPr>
+          <a:lstStyle/>
+          <a:p>
+            <a:r>
+              <a:rPr lang="en-US" dirty="0"/>
+              <a:t>Matrix Addition</a:t>
+            </a:r>
+          </a:p>
+        </p:txBody>
+      </p:sp>
+      <p:sp>
+        <p:nvSpPr>
+          <p:cNvPr id="85" name="TextBox 84">
+            <a:extLst>
+              <a:ext uri="{FF2B5EF4-FFF2-40B4-BE49-F238E27FC236}">
+                <a16:creationId xmlns:a16="http://schemas.microsoft.com/office/drawing/2014/main" id="{DBC3E27B-1E4C-BD8D-D0F9-DE42DFE4BDCA}"/>
+              </a:ext>
+            </a:extLst>
+          </p:cNvPr>
+          <p:cNvSpPr txBox="1"/>
+          <p:nvPr/>
+        </p:nvSpPr>
+        <p:spPr>
+          <a:xfrm>
+            <a:off x="4200649" y="3933966"/>
+            <a:ext cx="460207" cy="369332"/>
+          </a:xfrm>
+          <a:prstGeom prst="rect">
+            <a:avLst/>
+          </a:prstGeom>
+          <a:noFill/>
+        </p:spPr>
+        <p:txBody>
+          <a:bodyPr wrap="square" rtlCol="0">
+            <a:spAutoFit/>
+          </a:bodyPr>
+          <a:lstStyle/>
+          <a:p>
+            <a:r>
+              <a:rPr lang="en-US" dirty="0"/>
+              <a:t>Nx</a:t>
+            </a:r>
+          </a:p>
+        </p:txBody>
+      </p:sp>
+      <p:sp>
+        <p:nvSpPr>
+          <p:cNvPr id="86" name="Rectangle: Rounded Corners 85">
+            <a:extLst>
+              <a:ext uri="{FF2B5EF4-FFF2-40B4-BE49-F238E27FC236}">
+                <a16:creationId xmlns:a16="http://schemas.microsoft.com/office/drawing/2014/main" id="{48466696-AF5E-43C3-D178-FE71DF195F4C}"/>
+              </a:ext>
+            </a:extLst>
+          </p:cNvPr>
+          <p:cNvSpPr/>
+          <p:nvPr/>
+        </p:nvSpPr>
+        <p:spPr>
+          <a:xfrm>
+            <a:off x="5043505" y="1775358"/>
+            <a:ext cx="2088261" cy="476644"/>
+          </a:xfrm>
+          <a:prstGeom prst="roundRect">
+            <a:avLst/>
+          </a:prstGeom>
+          <a:solidFill>
+            <a:srgbClr val="DBDFEF"/>
+          </a:solidFill>
+        </p:spPr>
+        <p:style>
+          <a:lnRef idx="2">
+            <a:schemeClr val="accent1">
+              <a:shade val="15000"/>
+            </a:schemeClr>
+          </a:lnRef>
+          <a:fillRef idx="1">
+            <a:schemeClr val="accent1"/>
+          </a:fillRef>
+          <a:effectRef idx="0">
+            <a:schemeClr val="accent1"/>
+          </a:effectRef>
+          <a:fontRef idx="minor">
+            <a:schemeClr val="lt1"/>
+          </a:fontRef>
+        </p:style>
+        <p:txBody>
+          <a:bodyPr rtlCol="0" anchor="ctr"/>
+          <a:lstStyle/>
+          <a:p>
+            <a:pPr algn="ctr"/>
+            <a:endParaRPr lang="en-US"/>
+          </a:p>
+        </p:txBody>
+      </p:sp>
+      <p:sp>
+        <p:nvSpPr>
+          <p:cNvPr id="87" name="TextBox 86">
+            <a:extLst>
+              <a:ext uri="{FF2B5EF4-FFF2-40B4-BE49-F238E27FC236}">
+                <a16:creationId xmlns:a16="http://schemas.microsoft.com/office/drawing/2014/main" id="{125618B8-1F57-0ED0-3543-FDE537B5D876}"/>
+              </a:ext>
+            </a:extLst>
+          </p:cNvPr>
+          <p:cNvSpPr txBox="1"/>
+          <p:nvPr/>
+        </p:nvSpPr>
+        <p:spPr>
+          <a:xfrm>
+            <a:off x="5356115" y="1819909"/>
+            <a:ext cx="1463040" cy="369332"/>
+          </a:xfrm>
+          <a:prstGeom prst="rect">
+            <a:avLst/>
+          </a:prstGeom>
+          <a:noFill/>
+        </p:spPr>
+        <p:txBody>
+          <a:bodyPr wrap="square" rtlCol="0">
+            <a:spAutoFit/>
+          </a:bodyPr>
+          <a:lstStyle/>
+          <a:p>
+            <a:pPr algn="ctr"/>
+            <a:r>
+              <a:rPr lang="en-US" dirty="0"/>
+              <a:t>Linear</a:t>
+            </a:r>
+          </a:p>
+        </p:txBody>
+      </p:sp>
+      <p:sp>
+        <p:nvSpPr>
+          <p:cNvPr id="88" name="Rectangle: Rounded Corners 87">
+            <a:extLst>
+              <a:ext uri="{FF2B5EF4-FFF2-40B4-BE49-F238E27FC236}">
+                <a16:creationId xmlns:a16="http://schemas.microsoft.com/office/drawing/2014/main" id="{5408B452-E917-752B-9061-AD56F359C42E}"/>
+              </a:ext>
+            </a:extLst>
+          </p:cNvPr>
+          <p:cNvSpPr/>
+          <p:nvPr/>
+        </p:nvSpPr>
+        <p:spPr>
+          <a:xfrm>
+            <a:off x="5051869" y="938304"/>
+            <a:ext cx="2088261" cy="476644"/>
+          </a:xfrm>
+          <a:prstGeom prst="roundRect">
+            <a:avLst/>
+          </a:prstGeom>
+          <a:solidFill>
+            <a:srgbClr val="CCE7CF"/>
+          </a:solidFill>
+        </p:spPr>
+        <p:style>
+          <a:lnRef idx="2">
+            <a:schemeClr val="accent1">
+              <a:shade val="15000"/>
+            </a:schemeClr>
+          </a:lnRef>
+          <a:fillRef idx="1">
+            <a:schemeClr val="accent1"/>
+          </a:fillRef>
+          <a:effectRef idx="0">
+            <a:schemeClr val="accent1"/>
+          </a:effectRef>
+          <a:fontRef idx="minor">
+            <a:schemeClr val="lt1"/>
+          </a:fontRef>
+        </p:style>
+        <p:txBody>
+          <a:bodyPr rtlCol="0" anchor="ctr"/>
+          <a:lstStyle/>
+          <a:p>
+            <a:pPr algn="ctr"/>
+            <a:endParaRPr lang="en-US"/>
+          </a:p>
+        </p:txBody>
+      </p:sp>
+      <p:cxnSp>
+        <p:nvCxnSpPr>
+          <p:cNvPr id="89" name="Straight Arrow Connector 88">
+            <a:extLst>
+              <a:ext uri="{FF2B5EF4-FFF2-40B4-BE49-F238E27FC236}">
+                <a16:creationId xmlns:a16="http://schemas.microsoft.com/office/drawing/2014/main" id="{653088F4-DDF4-A222-17C8-C7EFC4BD911D}"/>
+              </a:ext>
+            </a:extLst>
+          </p:cNvPr>
+          <p:cNvCxnSpPr>
+            <a:cxnSpLocks/>
+          </p:cNvCxnSpPr>
+          <p:nvPr/>
+        </p:nvCxnSpPr>
+        <p:spPr>
+          <a:xfrm flipV="1">
+            <a:off x="6142237" y="1418454"/>
+            <a:ext cx="1" cy="365760"/>
+          </a:xfrm>
+          <a:prstGeom prst="straightConnector1">
+            <a:avLst/>
+          </a:prstGeom>
+          <a:ln>
+            <a:tailEnd type="triangle"/>
+          </a:ln>
+        </p:spPr>
+        <p:style>
+          <a:lnRef idx="2">
+            <a:schemeClr val="dk1"/>
+          </a:lnRef>
+          <a:fillRef idx="0">
+            <a:schemeClr val="dk1"/>
+          </a:fillRef>
+          <a:effectRef idx="1">
+            <a:schemeClr val="dk1"/>
+          </a:effectRef>
+          <a:fontRef idx="minor">
+            <a:schemeClr val="tx1"/>
+          </a:fontRef>
+        </p:style>
+      </p:cxnSp>
+      <p:sp>
+        <p:nvSpPr>
+          <p:cNvPr id="90" name="TextBox 89">
+            <a:extLst>
+              <a:ext uri="{FF2B5EF4-FFF2-40B4-BE49-F238E27FC236}">
+                <a16:creationId xmlns:a16="http://schemas.microsoft.com/office/drawing/2014/main" id="{43E06908-17A4-6761-E21A-848893E6353B}"/>
+              </a:ext>
+            </a:extLst>
+          </p:cNvPr>
+          <p:cNvSpPr txBox="1"/>
+          <p:nvPr/>
+        </p:nvSpPr>
+        <p:spPr>
+          <a:xfrm>
+            <a:off x="5356115" y="994229"/>
+            <a:ext cx="1463040" cy="369332"/>
+          </a:xfrm>
+          <a:prstGeom prst="rect">
+            <a:avLst/>
+          </a:prstGeom>
+          <a:noFill/>
+        </p:spPr>
+        <p:txBody>
+          <a:bodyPr wrap="square" rtlCol="0">
+            <a:spAutoFit/>
+          </a:bodyPr>
+          <a:lstStyle/>
+          <a:p>
+            <a:pPr algn="ctr"/>
+            <a:r>
+              <a:rPr lang="en-US" dirty="0"/>
               <a:t>Softmax</a:t>
             </a:r>
-            <a:endParaRPr lang="en-US" dirty="0"/>
           </a:p>
         </p:txBody>
       </p:sp>

</xml_diff>